<commit_message>
draft of vocab powerpoint
</commit_message>
<xml_diff>
--- a/GitHub_Steve.pptx
+++ b/GitHub_Steve.pptx
@@ -5,7 +5,7 @@
     <p:sldMasterId id="2147483648" r:id="rId1"/>
   </p:sldMasterIdLst>
   <p:notesMasterIdLst>
-    <p:notesMasterId r:id="rId15"/>
+    <p:notesMasterId r:id="rId19"/>
   </p:notesMasterIdLst>
   <p:sldIdLst>
     <p:sldId id="256" r:id="rId2"/>
@@ -20,7 +20,11 @@
     <p:sldId id="267" r:id="rId11"/>
     <p:sldId id="268" r:id="rId12"/>
     <p:sldId id="269" r:id="rId13"/>
-    <p:sldId id="261" r:id="rId14"/>
+    <p:sldId id="271" r:id="rId14"/>
+    <p:sldId id="272" r:id="rId15"/>
+    <p:sldId id="273" r:id="rId16"/>
+    <p:sldId id="270" r:id="rId17"/>
+    <p:sldId id="261" r:id="rId18"/>
   </p:sldIdLst>
   <p:sldSz cx="9144000" cy="6858000" type="screen4x3"/>
   <p:notesSz cx="6858000" cy="9144000"/>
@@ -1033,6 +1037,282 @@
     <p:extLst>
       <p:ext uri="{BB962C8B-B14F-4D97-AF65-F5344CB8AC3E}">
         <p14:creationId xmlns:p14="http://schemas.microsoft.com/office/powerpoint/2010/main" val="2609215321"/>
+      </p:ext>
+    </p:extLst>
+  </p:cSld>
+  <p:clrMapOvr>
+    <a:masterClrMapping/>
+  </p:clrMapOvr>
+</p:notes>
+</file>
+
+<file path=ppt/notesSlides/notesSlide7.xml><?xml version="1.0" encoding="utf-8"?>
+<p:notes xmlns:a="http://schemas.openxmlformats.org/drawingml/2006/main" xmlns:r="http://schemas.openxmlformats.org/officeDocument/2006/relationships" xmlns:p="http://schemas.openxmlformats.org/presentationml/2006/main">
+  <p:cSld>
+    <p:spTree>
+      <p:nvGrpSpPr>
+        <p:cNvPr id="1" name=""/>
+        <p:cNvGrpSpPr/>
+        <p:nvPr/>
+      </p:nvGrpSpPr>
+      <p:grpSpPr>
+        <a:xfrm>
+          <a:off x="0" y="0"/>
+          <a:ext cx="0" cy="0"/>
+          <a:chOff x="0" y="0"/>
+          <a:chExt cx="0" cy="0"/>
+        </a:xfrm>
+      </p:grpSpPr>
+      <p:sp>
+        <p:nvSpPr>
+          <p:cNvPr id="2" name="Slide Image Placeholder 1"/>
+          <p:cNvSpPr>
+            <a:spLocks noGrp="1" noRot="1" noChangeAspect="1"/>
+          </p:cNvSpPr>
+          <p:nvPr>
+            <p:ph type="sldImg"/>
+          </p:nvPr>
+        </p:nvSpPr>
+        <p:spPr/>
+      </p:sp>
+      <p:sp>
+        <p:nvSpPr>
+          <p:cNvPr id="3" name="Notes Placeholder 2"/>
+          <p:cNvSpPr>
+            <a:spLocks noGrp="1"/>
+          </p:cNvSpPr>
+          <p:nvPr>
+            <p:ph type="body" idx="1"/>
+          </p:nvPr>
+        </p:nvSpPr>
+        <p:spPr/>
+        <p:txBody>
+          <a:bodyPr/>
+          <a:lstStyle/>
+          <a:p>
+            <a:r>
+              <a:rPr lang="en-US" dirty="0" smtClean="0"/>
+              <a:t>Using Git</a:t>
+            </a:r>
+            <a:r>
+              <a:rPr lang="en-US" baseline="0" dirty="0" smtClean="0"/>
+              <a:t>Hub Desktop. Could also use command line.</a:t>
+            </a:r>
+            <a:endParaRPr lang="en-US" dirty="0"/>
+          </a:p>
+        </p:txBody>
+      </p:sp>
+      <p:sp>
+        <p:nvSpPr>
+          <p:cNvPr id="4" name="Slide Number Placeholder 3"/>
+          <p:cNvSpPr>
+            <a:spLocks noGrp="1"/>
+          </p:cNvSpPr>
+          <p:nvPr>
+            <p:ph type="sldNum" sz="quarter" idx="10"/>
+          </p:nvPr>
+        </p:nvSpPr>
+        <p:spPr/>
+        <p:txBody>
+          <a:bodyPr/>
+          <a:lstStyle/>
+          <a:p>
+            <a:fld id="{330637A4-5A62-4226-AE0F-A6A737EE5607}" type="slidenum">
+              <a:rPr lang="en-US" smtClean="0"/>
+              <a:t>13</a:t>
+            </a:fld>
+            <a:endParaRPr lang="en-US"/>
+          </a:p>
+        </p:txBody>
+      </p:sp>
+    </p:spTree>
+    <p:extLst>
+      <p:ext uri="{BB962C8B-B14F-4D97-AF65-F5344CB8AC3E}">
+        <p14:creationId xmlns:p14="http://schemas.microsoft.com/office/powerpoint/2010/main" val="3159450228"/>
+      </p:ext>
+    </p:extLst>
+  </p:cSld>
+  <p:clrMapOvr>
+    <a:masterClrMapping/>
+  </p:clrMapOvr>
+</p:notes>
+</file>
+
+<file path=ppt/notesSlides/notesSlide8.xml><?xml version="1.0" encoding="utf-8"?>
+<p:notes xmlns:a="http://schemas.openxmlformats.org/drawingml/2006/main" xmlns:r="http://schemas.openxmlformats.org/officeDocument/2006/relationships" xmlns:p="http://schemas.openxmlformats.org/presentationml/2006/main">
+  <p:cSld>
+    <p:spTree>
+      <p:nvGrpSpPr>
+        <p:cNvPr id="1" name=""/>
+        <p:cNvGrpSpPr/>
+        <p:nvPr/>
+      </p:nvGrpSpPr>
+      <p:grpSpPr>
+        <a:xfrm>
+          <a:off x="0" y="0"/>
+          <a:ext cx="0" cy="0"/>
+          <a:chOff x="0" y="0"/>
+          <a:chExt cx="0" cy="0"/>
+        </a:xfrm>
+      </p:grpSpPr>
+      <p:sp>
+        <p:nvSpPr>
+          <p:cNvPr id="2" name="Slide Image Placeholder 1"/>
+          <p:cNvSpPr>
+            <a:spLocks noGrp="1" noRot="1" noChangeAspect="1"/>
+          </p:cNvSpPr>
+          <p:nvPr>
+            <p:ph type="sldImg"/>
+          </p:nvPr>
+        </p:nvSpPr>
+        <p:spPr/>
+      </p:sp>
+      <p:sp>
+        <p:nvSpPr>
+          <p:cNvPr id="3" name="Notes Placeholder 2"/>
+          <p:cNvSpPr>
+            <a:spLocks noGrp="1"/>
+          </p:cNvSpPr>
+          <p:nvPr>
+            <p:ph type="body" idx="1"/>
+          </p:nvPr>
+        </p:nvSpPr>
+        <p:spPr/>
+        <p:txBody>
+          <a:bodyPr/>
+          <a:lstStyle/>
+          <a:p>
+            <a:r>
+              <a:rPr lang="en-US" dirty="0" smtClean="0"/>
+              <a:t>Using Git</a:t>
+            </a:r>
+            <a:r>
+              <a:rPr lang="en-US" baseline="0" dirty="0" smtClean="0"/>
+              <a:t>Hub Desktop. Could also use command line.</a:t>
+            </a:r>
+            <a:endParaRPr lang="en-US" dirty="0"/>
+          </a:p>
+        </p:txBody>
+      </p:sp>
+      <p:sp>
+        <p:nvSpPr>
+          <p:cNvPr id="4" name="Slide Number Placeholder 3"/>
+          <p:cNvSpPr>
+            <a:spLocks noGrp="1"/>
+          </p:cNvSpPr>
+          <p:nvPr>
+            <p:ph type="sldNum" sz="quarter" idx="10"/>
+          </p:nvPr>
+        </p:nvSpPr>
+        <p:spPr/>
+        <p:txBody>
+          <a:bodyPr/>
+          <a:lstStyle/>
+          <a:p>
+            <a:fld id="{330637A4-5A62-4226-AE0F-A6A737EE5607}" type="slidenum">
+              <a:rPr lang="en-US" smtClean="0"/>
+              <a:t>14</a:t>
+            </a:fld>
+            <a:endParaRPr lang="en-US"/>
+          </a:p>
+        </p:txBody>
+      </p:sp>
+    </p:spTree>
+    <p:extLst>
+      <p:ext uri="{BB962C8B-B14F-4D97-AF65-F5344CB8AC3E}">
+        <p14:creationId xmlns:p14="http://schemas.microsoft.com/office/powerpoint/2010/main" val="953683251"/>
+      </p:ext>
+    </p:extLst>
+  </p:cSld>
+  <p:clrMapOvr>
+    <a:masterClrMapping/>
+  </p:clrMapOvr>
+</p:notes>
+</file>
+
+<file path=ppt/notesSlides/notesSlide9.xml><?xml version="1.0" encoding="utf-8"?>
+<p:notes xmlns:a="http://schemas.openxmlformats.org/drawingml/2006/main" xmlns:r="http://schemas.openxmlformats.org/officeDocument/2006/relationships" xmlns:p="http://schemas.openxmlformats.org/presentationml/2006/main">
+  <p:cSld>
+    <p:spTree>
+      <p:nvGrpSpPr>
+        <p:cNvPr id="1" name=""/>
+        <p:cNvGrpSpPr/>
+        <p:nvPr/>
+      </p:nvGrpSpPr>
+      <p:grpSpPr>
+        <a:xfrm>
+          <a:off x="0" y="0"/>
+          <a:ext cx="0" cy="0"/>
+          <a:chOff x="0" y="0"/>
+          <a:chExt cx="0" cy="0"/>
+        </a:xfrm>
+      </p:grpSpPr>
+      <p:sp>
+        <p:nvSpPr>
+          <p:cNvPr id="2" name="Slide Image Placeholder 1"/>
+          <p:cNvSpPr>
+            <a:spLocks noGrp="1" noRot="1" noChangeAspect="1"/>
+          </p:cNvSpPr>
+          <p:nvPr>
+            <p:ph type="sldImg"/>
+          </p:nvPr>
+        </p:nvSpPr>
+        <p:spPr/>
+      </p:sp>
+      <p:sp>
+        <p:nvSpPr>
+          <p:cNvPr id="3" name="Notes Placeholder 2"/>
+          <p:cNvSpPr>
+            <a:spLocks noGrp="1"/>
+          </p:cNvSpPr>
+          <p:nvPr>
+            <p:ph type="body" idx="1"/>
+          </p:nvPr>
+        </p:nvSpPr>
+        <p:spPr/>
+        <p:txBody>
+          <a:bodyPr/>
+          <a:lstStyle/>
+          <a:p>
+            <a:r>
+              <a:rPr lang="en-US" dirty="0" smtClean="0"/>
+              <a:t>Using Git</a:t>
+            </a:r>
+            <a:r>
+              <a:rPr lang="en-US" baseline="0" dirty="0" smtClean="0"/>
+              <a:t>Hub Desktop. Could also use command line.</a:t>
+            </a:r>
+            <a:endParaRPr lang="en-US" dirty="0"/>
+          </a:p>
+        </p:txBody>
+      </p:sp>
+      <p:sp>
+        <p:nvSpPr>
+          <p:cNvPr id="4" name="Slide Number Placeholder 3"/>
+          <p:cNvSpPr>
+            <a:spLocks noGrp="1"/>
+          </p:cNvSpPr>
+          <p:nvPr>
+            <p:ph type="sldNum" sz="quarter" idx="10"/>
+          </p:nvPr>
+        </p:nvSpPr>
+        <p:spPr/>
+        <p:txBody>
+          <a:bodyPr/>
+          <a:lstStyle/>
+          <a:p>
+            <a:fld id="{330637A4-5A62-4226-AE0F-A6A737EE5607}" type="slidenum">
+              <a:rPr lang="en-US" smtClean="0"/>
+              <a:t>15</a:t>
+            </a:fld>
+            <a:endParaRPr lang="en-US"/>
+          </a:p>
+        </p:txBody>
+      </p:sp>
+    </p:spTree>
+    <p:extLst>
+      <p:ext uri="{BB962C8B-B14F-4D97-AF65-F5344CB8AC3E}">
+        <p14:creationId xmlns:p14="http://schemas.microsoft.com/office/powerpoint/2010/main" val="1372272744"/>
       </p:ext>
     </p:extLst>
   </p:cSld>
@@ -4798,7 +5078,7 @@
         </p:blipFill>
         <p:spPr>
           <a:xfrm>
-            <a:off x="5105400" y="1909762"/>
+            <a:off x="4587089" y="1393495"/>
             <a:ext cx="2324100" cy="2686050"/>
           </a:xfrm>
           <a:prstGeom prst="rect">
@@ -4830,6 +5110,42 @@
           </a:prstGeom>
         </p:spPr>
       </p:pic>
+      <p:sp>
+        <p:nvSpPr>
+          <p:cNvPr id="11" name="TextBox 10"/>
+          <p:cNvSpPr txBox="1"/>
+          <p:nvPr/>
+        </p:nvSpPr>
+        <p:spPr>
+          <a:xfrm>
+            <a:off x="4128395" y="4756540"/>
+            <a:ext cx="4939405" cy="923330"/>
+          </a:xfrm>
+          <a:prstGeom prst="rect">
+            <a:avLst/>
+          </a:prstGeom>
+          <a:noFill/>
+        </p:spPr>
+        <p:txBody>
+          <a:bodyPr wrap="square" rtlCol="0">
+            <a:spAutoFit/>
+          </a:bodyPr>
+          <a:lstStyle/>
+          <a:p>
+            <a:r>
+              <a:rPr lang="en-US" dirty="0" smtClean="0"/>
+              <a:t>Add a file, change something, add something…</a:t>
+            </a:r>
+          </a:p>
+          <a:p>
+            <a:r>
+              <a:rPr lang="en-US" dirty="0" smtClean="0"/>
+              <a:t>For the demo, try adding a new text file to the directory</a:t>
+            </a:r>
+            <a:endParaRPr lang="en-US" dirty="0"/>
+          </a:p>
+        </p:txBody>
+      </p:sp>
     </p:spTree>
     <p:extLst>
       <p:ext uri="{BB962C8B-B14F-4D97-AF65-F5344CB8AC3E}">
@@ -5672,6 +5988,16 @@
 <file path=ppt/slides/slide13.xml><?xml version="1.0" encoding="utf-8"?>
 <p:sld xmlns:a="http://schemas.openxmlformats.org/drawingml/2006/main" xmlns:r="http://schemas.openxmlformats.org/officeDocument/2006/relationships" xmlns:p="http://schemas.openxmlformats.org/presentationml/2006/main">
   <p:cSld>
+    <p:bg>
+      <p:bgPr>
+        <a:solidFill>
+          <a:schemeClr val="bg1">
+            <a:lumMod val="65000"/>
+          </a:schemeClr>
+        </a:solidFill>
+        <a:effectLst/>
+      </p:bgPr>
+    </p:bg>
     <p:spTree>
       <p:nvGrpSpPr>
         <p:cNvPr id="1" name=""/>
@@ -5688,6 +6014,62 @@
       </p:grpSpPr>
       <p:sp>
         <p:nvSpPr>
+          <p:cNvPr id="5" name="Rectangle 4"/>
+          <p:cNvSpPr/>
+          <p:nvPr/>
+        </p:nvSpPr>
+        <p:spPr>
+          <a:xfrm>
+            <a:off x="0" y="6172200"/>
+            <a:ext cx="9144000" cy="685800"/>
+          </a:xfrm>
+          <a:prstGeom prst="rect">
+            <a:avLst/>
+          </a:prstGeom>
+          <a:gradFill>
+            <a:gsLst>
+              <a:gs pos="0">
+                <a:schemeClr val="bg1"/>
+              </a:gs>
+              <a:gs pos="100000">
+                <a:schemeClr val="bg1">
+                  <a:alpha val="0"/>
+                </a:schemeClr>
+              </a:gs>
+            </a:gsLst>
+            <a:lin ang="10800000" scaled="0"/>
+          </a:gradFill>
+          <a:ln>
+            <a:noFill/>
+          </a:ln>
+        </p:spPr>
+        <p:style>
+          <a:lnRef idx="2">
+            <a:schemeClr val="accent1">
+              <a:shade val="50000"/>
+            </a:schemeClr>
+          </a:lnRef>
+          <a:fillRef idx="1">
+            <a:schemeClr val="accent1"/>
+          </a:fillRef>
+          <a:effectRef idx="0">
+            <a:schemeClr val="accent1"/>
+          </a:effectRef>
+          <a:fontRef idx="minor">
+            <a:schemeClr val="lt1"/>
+          </a:fontRef>
+        </p:style>
+        <p:txBody>
+          <a:bodyPr rtlCol="0" anchor="ctr"/>
+          <a:lstStyle/>
+          <a:p>
+            <a:pPr algn="ctr"/>
+            <a:endParaRPr lang="en-US"/>
+          </a:p>
+        </p:txBody>
+      </p:sp>
+      <p:sp>
+        <p:nvSpPr>
           <p:cNvPr id="2" name="Title 1"/>
           <p:cNvSpPr>
             <a:spLocks noGrp="1"/>
@@ -5701,7 +6083,24 @@
           <a:bodyPr/>
           <a:lstStyle/>
           <a:p>
-            <a:endParaRPr lang="en-US"/>
+            <a:pPr algn="l"/>
+            <a:r>
+              <a:rPr lang="en-US" dirty="0" smtClean="0">
+                <a:solidFill>
+                  <a:schemeClr val="accent1">
+                    <a:lumMod val="50000"/>
+                  </a:schemeClr>
+                </a:solidFill>
+              </a:rPr>
+              <a:t>[commit demo]</a:t>
+            </a:r>
+            <a:endParaRPr lang="en-US" dirty="0">
+              <a:solidFill>
+                <a:schemeClr val="accent1">
+                  <a:lumMod val="50000"/>
+                </a:schemeClr>
+              </a:solidFill>
+            </a:endParaRPr>
           </a:p>
         </p:txBody>
       </p:sp>
@@ -5720,6 +6119,1465 @@
           <a:bodyPr/>
           <a:lstStyle/>
           <a:p>
+            <a:r>
+              <a:rPr lang="en-US" dirty="0" smtClean="0"/>
+              <a:t>Click Changes (should have a dot indicating a change)</a:t>
+            </a:r>
+          </a:p>
+          <a:p>
+            <a:r>
+              <a:rPr lang="en-US" dirty="0" smtClean="0"/>
+              <a:t>Changes are listed</a:t>
+            </a:r>
+          </a:p>
+          <a:p>
+            <a:r>
+              <a:rPr lang="en-US" dirty="0" smtClean="0"/>
+              <a:t>Note the changes briefly</a:t>
+            </a:r>
+          </a:p>
+          <a:p>
+            <a:r>
+              <a:rPr lang="en-US" dirty="0" smtClean="0"/>
+              <a:t>Click Commit to [branch name]</a:t>
+            </a:r>
+          </a:p>
+          <a:p>
+            <a:endParaRPr lang="en-US" dirty="0" smtClean="0"/>
+          </a:p>
+        </p:txBody>
+      </p:sp>
+      <p:pic>
+        <p:nvPicPr>
+          <p:cNvPr id="2050" name="Picture 2" descr="D:\data\market\3_logo\LTIlogo_object.png"/>
+          <p:cNvPicPr>
+            <a:picLocks noChangeAspect="1" noChangeArrowheads="1"/>
+          </p:cNvPicPr>
+          <p:nvPr/>
+        </p:nvPicPr>
+        <p:blipFill>
+          <a:blip r:embed="rId3" cstate="print"/>
+          <a:srcRect l="28571" t="23077" r="27473" b="23077"/>
+          <a:stretch>
+            <a:fillRect/>
+          </a:stretch>
+        </p:blipFill>
+        <p:spPr bwMode="auto">
+          <a:xfrm>
+            <a:off x="8077200" y="5943600"/>
+            <a:ext cx="990600" cy="866775"/>
+          </a:xfrm>
+          <a:prstGeom prst="rect">
+            <a:avLst/>
+          </a:prstGeom>
+          <a:noFill/>
+          <a:effectLst>
+            <a:outerShdw blurRad="50800" dist="38100" dir="2700000" algn="tl" rotWithShape="0">
+              <a:prstClr val="black">
+                <a:alpha val="40000"/>
+              </a:prstClr>
+            </a:outerShdw>
+          </a:effectLst>
+        </p:spPr>
+      </p:pic>
+      <p:sp>
+        <p:nvSpPr>
+          <p:cNvPr id="8" name="Slide Number Placeholder 7"/>
+          <p:cNvSpPr txBox="1">
+            <a:spLocks/>
+          </p:cNvSpPr>
+          <p:nvPr/>
+        </p:nvSpPr>
+        <p:spPr>
+          <a:xfrm>
+            <a:off x="5791200" y="6324600"/>
+            <a:ext cx="2133600" cy="365125"/>
+          </a:xfrm>
+          <a:prstGeom prst="rect">
+            <a:avLst/>
+          </a:prstGeom>
+        </p:spPr>
+        <p:txBody>
+          <a:bodyPr vert="horz" lIns="91440" tIns="45720" rIns="91440" bIns="45720" rtlCol="0" anchor="ctr"/>
+          <a:lstStyle/>
+          <a:p>
+            <a:pPr marL="0" marR="0" lvl="0" indent="0" algn="r" defTabSz="914400" rtl="0" eaLnBrk="1" fontAlgn="auto" latinLnBrk="0" hangingPunct="1">
+              <a:lnSpc>
+                <a:spcPct val="100000"/>
+              </a:lnSpc>
+              <a:spcBef>
+                <a:spcPts val="0"/>
+              </a:spcBef>
+              <a:spcAft>
+                <a:spcPts val="0"/>
+              </a:spcAft>
+              <a:buClrTx/>
+              <a:buSzTx/>
+              <a:buFontTx/>
+              <a:buNone/>
+              <a:tabLst/>
+              <a:defRPr/>
+            </a:pPr>
+            <a:r>
+              <a:rPr kumimoji="0" lang="en-US" sz="1400" b="0" i="0" u="none" strike="noStrike" kern="1200" cap="none" spc="0" normalizeH="0" baseline="0" noProof="0" dirty="0" smtClean="0">
+                <a:ln>
+                  <a:noFill/>
+                </a:ln>
+                <a:solidFill>
+                  <a:schemeClr val="accent3">
+                    <a:lumMod val="50000"/>
+                  </a:schemeClr>
+                </a:solidFill>
+                <a:effectLst/>
+                <a:uLnTx/>
+                <a:uFillTx/>
+                <a:latin typeface="+mn-lt"/>
+                <a:ea typeface="+mn-ea"/>
+                <a:cs typeface="+mn-cs"/>
+              </a:rPr>
+              <a:t>SLIDE </a:t>
+            </a:r>
+            <a:fld id="{C04375EB-5169-4238-8270-5D5536267021}" type="slidenum">
+              <a:rPr kumimoji="0" lang="en-US" sz="1400" b="0" i="0" u="none" strike="noStrike" kern="1200" cap="none" spc="0" normalizeH="0" baseline="0" noProof="0" smtClean="0">
+                <a:ln>
+                  <a:noFill/>
+                </a:ln>
+                <a:solidFill>
+                  <a:schemeClr val="accent3">
+                    <a:lumMod val="50000"/>
+                  </a:schemeClr>
+                </a:solidFill>
+                <a:effectLst/>
+                <a:uLnTx/>
+                <a:uFillTx/>
+                <a:latin typeface="+mn-lt"/>
+                <a:ea typeface="+mn-ea"/>
+                <a:cs typeface="+mn-cs"/>
+              </a:rPr>
+              <a:pPr marL="0" marR="0" lvl="0" indent="0" algn="r" defTabSz="914400" rtl="0" eaLnBrk="1" fontAlgn="auto" latinLnBrk="0" hangingPunct="1">
+                <a:lnSpc>
+                  <a:spcPct val="100000"/>
+                </a:lnSpc>
+                <a:spcBef>
+                  <a:spcPts val="0"/>
+                </a:spcBef>
+                <a:spcAft>
+                  <a:spcPts val="0"/>
+                </a:spcAft>
+                <a:buClrTx/>
+                <a:buSzTx/>
+                <a:buFontTx/>
+                <a:buNone/>
+                <a:tabLst/>
+                <a:defRPr/>
+              </a:pPr>
+              <a:t>13</a:t>
+            </a:fld>
+            <a:endParaRPr kumimoji="0" lang="en-US" sz="1400" b="0" i="0" u="none" strike="noStrike" kern="1200" cap="none" spc="0" normalizeH="0" baseline="0" noProof="0" dirty="0">
+              <a:ln>
+                <a:noFill/>
+              </a:ln>
+              <a:solidFill>
+                <a:schemeClr val="accent3">
+                  <a:lumMod val="50000"/>
+                </a:schemeClr>
+              </a:solidFill>
+              <a:effectLst/>
+              <a:uLnTx/>
+              <a:uFillTx/>
+              <a:latin typeface="+mn-lt"/>
+              <a:ea typeface="+mn-ea"/>
+              <a:cs typeface="+mn-cs"/>
+            </a:endParaRPr>
+          </a:p>
+        </p:txBody>
+      </p:sp>
+    </p:spTree>
+    <p:extLst>
+      <p:ext uri="{BB962C8B-B14F-4D97-AF65-F5344CB8AC3E}">
+        <p14:creationId xmlns:p14="http://schemas.microsoft.com/office/powerpoint/2010/main" val="1416649040"/>
+      </p:ext>
+    </p:extLst>
+  </p:cSld>
+  <p:clrMapOvr>
+    <a:masterClrMapping/>
+  </p:clrMapOvr>
+  <p:timing>
+    <p:tnLst>
+      <p:par>
+        <p:cTn id="1" dur="indefinite" restart="never" nodeType="tmRoot"/>
+      </p:par>
+    </p:tnLst>
+  </p:timing>
+</p:sld>
+</file>
+
+<file path=ppt/slides/slide14.xml><?xml version="1.0" encoding="utf-8"?>
+<p:sld xmlns:a="http://schemas.openxmlformats.org/drawingml/2006/main" xmlns:r="http://schemas.openxmlformats.org/officeDocument/2006/relationships" xmlns:p="http://schemas.openxmlformats.org/presentationml/2006/main">
+  <p:cSld>
+    <p:bg>
+      <p:bgPr>
+        <a:solidFill>
+          <a:schemeClr val="bg1">
+            <a:lumMod val="65000"/>
+          </a:schemeClr>
+        </a:solidFill>
+        <a:effectLst/>
+      </p:bgPr>
+    </p:bg>
+    <p:spTree>
+      <p:nvGrpSpPr>
+        <p:cNvPr id="1" name=""/>
+        <p:cNvGrpSpPr/>
+        <p:nvPr/>
+      </p:nvGrpSpPr>
+      <p:grpSpPr>
+        <a:xfrm>
+          <a:off x="0" y="0"/>
+          <a:ext cx="0" cy="0"/>
+          <a:chOff x="0" y="0"/>
+          <a:chExt cx="0" cy="0"/>
+        </a:xfrm>
+      </p:grpSpPr>
+      <p:cxnSp>
+        <p:nvCxnSpPr>
+          <p:cNvPr id="15" name="Straight Arrow Connector 14"/>
+          <p:cNvCxnSpPr/>
+          <p:nvPr/>
+        </p:nvCxnSpPr>
+        <p:spPr>
+          <a:xfrm>
+            <a:off x="2080941" y="3501000"/>
+            <a:ext cx="1028700" cy="767835"/>
+          </a:xfrm>
+          <a:prstGeom prst="straightConnector1">
+            <a:avLst/>
+          </a:prstGeom>
+          <a:ln w="76200">
+            <a:headEnd type="none" w="med" len="med"/>
+            <a:tailEnd type="none" w="med" len="med"/>
+          </a:ln>
+        </p:spPr>
+        <p:style>
+          <a:lnRef idx="1">
+            <a:schemeClr val="accent6"/>
+          </a:lnRef>
+          <a:fillRef idx="0">
+            <a:schemeClr val="accent6"/>
+          </a:fillRef>
+          <a:effectRef idx="0">
+            <a:schemeClr val="accent6"/>
+          </a:effectRef>
+          <a:fontRef idx="minor">
+            <a:schemeClr val="tx1"/>
+          </a:fontRef>
+        </p:style>
+      </p:cxnSp>
+      <p:cxnSp>
+        <p:nvCxnSpPr>
+          <p:cNvPr id="20" name="Straight Arrow Connector 19"/>
+          <p:cNvCxnSpPr>
+            <a:endCxn id="19" idx="6"/>
+          </p:cNvCxnSpPr>
+          <p:nvPr/>
+        </p:nvCxnSpPr>
+        <p:spPr>
+          <a:xfrm>
+            <a:off x="3146987" y="4204114"/>
+            <a:ext cx="913750" cy="16975"/>
+          </a:xfrm>
+          <a:prstGeom prst="straightConnector1">
+            <a:avLst/>
+          </a:prstGeom>
+          <a:ln w="76200">
+            <a:headEnd type="none" w="med" len="med"/>
+            <a:tailEnd type="none" w="med" len="med"/>
+          </a:ln>
+        </p:spPr>
+        <p:style>
+          <a:lnRef idx="1">
+            <a:schemeClr val="accent6"/>
+          </a:lnRef>
+          <a:fillRef idx="0">
+            <a:schemeClr val="accent6"/>
+          </a:fillRef>
+          <a:effectRef idx="0">
+            <a:schemeClr val="accent6"/>
+          </a:effectRef>
+          <a:fontRef idx="minor">
+            <a:schemeClr val="tx1"/>
+          </a:fontRef>
+        </p:style>
+      </p:cxnSp>
+      <p:sp>
+        <p:nvSpPr>
+          <p:cNvPr id="5" name="Rectangle 4"/>
+          <p:cNvSpPr/>
+          <p:nvPr/>
+        </p:nvSpPr>
+        <p:spPr>
+          <a:xfrm>
+            <a:off x="0" y="6172200"/>
+            <a:ext cx="9144000" cy="685800"/>
+          </a:xfrm>
+          <a:prstGeom prst="rect">
+            <a:avLst/>
+          </a:prstGeom>
+          <a:gradFill>
+            <a:gsLst>
+              <a:gs pos="0">
+                <a:schemeClr val="bg1"/>
+              </a:gs>
+              <a:gs pos="100000">
+                <a:schemeClr val="bg1">
+                  <a:alpha val="0"/>
+                </a:schemeClr>
+              </a:gs>
+            </a:gsLst>
+            <a:lin ang="10800000" scaled="0"/>
+          </a:gradFill>
+          <a:ln>
+            <a:noFill/>
+          </a:ln>
+        </p:spPr>
+        <p:style>
+          <a:lnRef idx="2">
+            <a:schemeClr val="accent1">
+              <a:shade val="50000"/>
+            </a:schemeClr>
+          </a:lnRef>
+          <a:fillRef idx="1">
+            <a:schemeClr val="accent1"/>
+          </a:fillRef>
+          <a:effectRef idx="0">
+            <a:schemeClr val="accent1"/>
+          </a:effectRef>
+          <a:fontRef idx="minor">
+            <a:schemeClr val="lt1"/>
+          </a:fontRef>
+        </p:style>
+        <p:txBody>
+          <a:bodyPr rtlCol="0" anchor="ctr"/>
+          <a:lstStyle/>
+          <a:p>
+            <a:pPr algn="ctr"/>
+            <a:endParaRPr lang="en-US"/>
+          </a:p>
+        </p:txBody>
+      </p:sp>
+      <p:sp>
+        <p:nvSpPr>
+          <p:cNvPr id="2" name="Title 1"/>
+          <p:cNvSpPr>
+            <a:spLocks noGrp="1"/>
+          </p:cNvSpPr>
+          <p:nvPr>
+            <p:ph type="title"/>
+          </p:nvPr>
+        </p:nvSpPr>
+        <p:spPr/>
+        <p:txBody>
+          <a:bodyPr/>
+          <a:lstStyle/>
+          <a:p>
+            <a:pPr algn="l"/>
+            <a:r>
+              <a:rPr lang="en-US" dirty="0" smtClean="0">
+                <a:solidFill>
+                  <a:schemeClr val="accent1">
+                    <a:lumMod val="50000"/>
+                  </a:schemeClr>
+                </a:solidFill>
+              </a:rPr>
+              <a:t>Pull Request</a:t>
+            </a:r>
+            <a:endParaRPr lang="en-US" dirty="0">
+              <a:solidFill>
+                <a:schemeClr val="accent1">
+                  <a:lumMod val="50000"/>
+                </a:schemeClr>
+              </a:solidFill>
+            </a:endParaRPr>
+          </a:p>
+        </p:txBody>
+      </p:sp>
+      <p:pic>
+        <p:nvPicPr>
+          <p:cNvPr id="2050" name="Picture 2" descr="D:\data\market\3_logo\LTIlogo_object.png"/>
+          <p:cNvPicPr>
+            <a:picLocks noChangeAspect="1" noChangeArrowheads="1"/>
+          </p:cNvPicPr>
+          <p:nvPr/>
+        </p:nvPicPr>
+        <p:blipFill>
+          <a:blip r:embed="rId3" cstate="print"/>
+          <a:srcRect l="28571" t="23077" r="27473" b="23077"/>
+          <a:stretch>
+            <a:fillRect/>
+          </a:stretch>
+        </p:blipFill>
+        <p:spPr bwMode="auto">
+          <a:xfrm>
+            <a:off x="8077200" y="5943600"/>
+            <a:ext cx="990600" cy="866775"/>
+          </a:xfrm>
+          <a:prstGeom prst="rect">
+            <a:avLst/>
+          </a:prstGeom>
+          <a:noFill/>
+          <a:effectLst>
+            <a:outerShdw blurRad="50800" dist="38100" dir="2700000" algn="tl" rotWithShape="0">
+              <a:prstClr val="black">
+                <a:alpha val="40000"/>
+              </a:prstClr>
+            </a:outerShdw>
+          </a:effectLst>
+        </p:spPr>
+      </p:pic>
+      <p:sp>
+        <p:nvSpPr>
+          <p:cNvPr id="8" name="Slide Number Placeholder 7"/>
+          <p:cNvSpPr txBox="1">
+            <a:spLocks/>
+          </p:cNvSpPr>
+          <p:nvPr/>
+        </p:nvSpPr>
+        <p:spPr>
+          <a:xfrm>
+            <a:off x="5791200" y="6324600"/>
+            <a:ext cx="2133600" cy="365125"/>
+          </a:xfrm>
+          <a:prstGeom prst="rect">
+            <a:avLst/>
+          </a:prstGeom>
+        </p:spPr>
+        <p:txBody>
+          <a:bodyPr vert="horz" lIns="91440" tIns="45720" rIns="91440" bIns="45720" rtlCol="0" anchor="ctr"/>
+          <a:lstStyle/>
+          <a:p>
+            <a:pPr marL="0" marR="0" lvl="0" indent="0" algn="r" defTabSz="914400" rtl="0" eaLnBrk="1" fontAlgn="auto" latinLnBrk="0" hangingPunct="1">
+              <a:lnSpc>
+                <a:spcPct val="100000"/>
+              </a:lnSpc>
+              <a:spcBef>
+                <a:spcPts val="0"/>
+              </a:spcBef>
+              <a:spcAft>
+                <a:spcPts val="0"/>
+              </a:spcAft>
+              <a:buClrTx/>
+              <a:buSzTx/>
+              <a:buFontTx/>
+              <a:buNone/>
+              <a:tabLst/>
+              <a:defRPr/>
+            </a:pPr>
+            <a:r>
+              <a:rPr kumimoji="0" lang="en-US" sz="1400" b="0" i="0" u="none" strike="noStrike" kern="1200" cap="none" spc="0" normalizeH="0" baseline="0" noProof="0" dirty="0" smtClean="0">
+                <a:ln>
+                  <a:noFill/>
+                </a:ln>
+                <a:solidFill>
+                  <a:schemeClr val="accent3">
+                    <a:lumMod val="50000"/>
+                  </a:schemeClr>
+                </a:solidFill>
+                <a:effectLst/>
+                <a:uLnTx/>
+                <a:uFillTx/>
+                <a:latin typeface="+mn-lt"/>
+                <a:ea typeface="+mn-ea"/>
+                <a:cs typeface="+mn-cs"/>
+              </a:rPr>
+              <a:t>SLIDE </a:t>
+            </a:r>
+            <a:fld id="{C04375EB-5169-4238-8270-5D5536267021}" type="slidenum">
+              <a:rPr kumimoji="0" lang="en-US" sz="1400" b="0" i="0" u="none" strike="noStrike" kern="1200" cap="none" spc="0" normalizeH="0" baseline="0" noProof="0" smtClean="0">
+                <a:ln>
+                  <a:noFill/>
+                </a:ln>
+                <a:solidFill>
+                  <a:schemeClr val="accent3">
+                    <a:lumMod val="50000"/>
+                  </a:schemeClr>
+                </a:solidFill>
+                <a:effectLst/>
+                <a:uLnTx/>
+                <a:uFillTx/>
+                <a:latin typeface="+mn-lt"/>
+                <a:ea typeface="+mn-ea"/>
+                <a:cs typeface="+mn-cs"/>
+              </a:rPr>
+              <a:pPr marL="0" marR="0" lvl="0" indent="0" algn="r" defTabSz="914400" rtl="0" eaLnBrk="1" fontAlgn="auto" latinLnBrk="0" hangingPunct="1">
+                <a:lnSpc>
+                  <a:spcPct val="100000"/>
+                </a:lnSpc>
+                <a:spcBef>
+                  <a:spcPts val="0"/>
+                </a:spcBef>
+                <a:spcAft>
+                  <a:spcPts val="0"/>
+                </a:spcAft>
+                <a:buClrTx/>
+                <a:buSzTx/>
+                <a:buFontTx/>
+                <a:buNone/>
+                <a:tabLst/>
+                <a:defRPr/>
+              </a:pPr>
+              <a:t>14</a:t>
+            </a:fld>
+            <a:endParaRPr kumimoji="0" lang="en-US" sz="1400" b="0" i="0" u="none" strike="noStrike" kern="1200" cap="none" spc="0" normalizeH="0" baseline="0" noProof="0" dirty="0">
+              <a:ln>
+                <a:noFill/>
+              </a:ln>
+              <a:solidFill>
+                <a:schemeClr val="accent3">
+                  <a:lumMod val="50000"/>
+                </a:schemeClr>
+              </a:solidFill>
+              <a:effectLst/>
+              <a:uLnTx/>
+              <a:uFillTx/>
+              <a:latin typeface="+mn-lt"/>
+              <a:ea typeface="+mn-ea"/>
+              <a:cs typeface="+mn-cs"/>
+            </a:endParaRPr>
+          </a:p>
+        </p:txBody>
+      </p:sp>
+      <p:sp>
+        <p:nvSpPr>
+          <p:cNvPr id="4" name="TextBox 3"/>
+          <p:cNvSpPr txBox="1"/>
+          <p:nvPr/>
+        </p:nvSpPr>
+        <p:spPr>
+          <a:xfrm>
+            <a:off x="304801" y="1461572"/>
+            <a:ext cx="8610600" cy="923330"/>
+          </a:xfrm>
+          <a:prstGeom prst="rect">
+            <a:avLst/>
+          </a:prstGeom>
+          <a:noFill/>
+        </p:spPr>
+        <p:txBody>
+          <a:bodyPr wrap="square" rtlCol="0">
+            <a:spAutoFit/>
+          </a:bodyPr>
+          <a:lstStyle/>
+          <a:p>
+            <a:r>
+              <a:rPr lang="en-US" b="1" dirty="0" smtClean="0"/>
+              <a:t>Pull Request: </a:t>
+            </a:r>
+            <a:r>
+              <a:rPr lang="en-US" dirty="0" smtClean="0"/>
+              <a:t>Merge the changes from a </a:t>
+            </a:r>
+            <a:r>
+              <a:rPr lang="en-US" b="1" dirty="0" smtClean="0"/>
+              <a:t>branch </a:t>
+            </a:r>
+            <a:r>
+              <a:rPr lang="en-US" dirty="0" smtClean="0"/>
+              <a:t>to the </a:t>
+            </a:r>
+            <a:r>
+              <a:rPr lang="en-US" b="1" dirty="0" smtClean="0"/>
+              <a:t>master</a:t>
+            </a:r>
+            <a:r>
+              <a:rPr lang="en-US" dirty="0" smtClean="0"/>
+              <a:t> and sync it with GitHub. Use a </a:t>
+            </a:r>
+            <a:r>
+              <a:rPr lang="en-US" b="1" dirty="0" smtClean="0"/>
+              <a:t>Pull Request</a:t>
+            </a:r>
+            <a:r>
+              <a:rPr lang="en-US" dirty="0" smtClean="0"/>
+              <a:t> to submit your changes to the project that you want everybody to have access to.</a:t>
+            </a:r>
+            <a:endParaRPr lang="en-US" b="1" dirty="0"/>
+          </a:p>
+        </p:txBody>
+      </p:sp>
+      <p:cxnSp>
+        <p:nvCxnSpPr>
+          <p:cNvPr id="9" name="Straight Arrow Connector 8"/>
+          <p:cNvCxnSpPr/>
+          <p:nvPr/>
+        </p:nvCxnSpPr>
+        <p:spPr>
+          <a:xfrm>
+            <a:off x="251387" y="3485971"/>
+            <a:ext cx="5791200" cy="0"/>
+          </a:xfrm>
+          <a:prstGeom prst="straightConnector1">
+            <a:avLst/>
+          </a:prstGeom>
+          <a:ln w="57150">
+            <a:tailEnd type="triangle"/>
+          </a:ln>
+        </p:spPr>
+        <p:style>
+          <a:lnRef idx="1">
+            <a:schemeClr val="accent1"/>
+          </a:lnRef>
+          <a:fillRef idx="0">
+            <a:schemeClr val="accent1"/>
+          </a:fillRef>
+          <a:effectRef idx="0">
+            <a:schemeClr val="accent1"/>
+          </a:effectRef>
+          <a:fontRef idx="minor">
+            <a:schemeClr val="tx1"/>
+          </a:fontRef>
+        </p:style>
+      </p:cxnSp>
+      <p:sp>
+        <p:nvSpPr>
+          <p:cNvPr id="10" name="Oval 9"/>
+          <p:cNvSpPr/>
+          <p:nvPr/>
+        </p:nvSpPr>
+        <p:spPr>
+          <a:xfrm>
+            <a:off x="556187" y="3345909"/>
+            <a:ext cx="228600" cy="228600"/>
+          </a:xfrm>
+          <a:prstGeom prst="ellipse">
+            <a:avLst/>
+          </a:prstGeom>
+        </p:spPr>
+        <p:style>
+          <a:lnRef idx="2">
+            <a:schemeClr val="accent1">
+              <a:shade val="50000"/>
+            </a:schemeClr>
+          </a:lnRef>
+          <a:fillRef idx="1">
+            <a:schemeClr val="accent1"/>
+          </a:fillRef>
+          <a:effectRef idx="0">
+            <a:schemeClr val="accent1"/>
+          </a:effectRef>
+          <a:fontRef idx="minor">
+            <a:schemeClr val="lt1"/>
+          </a:fontRef>
+        </p:style>
+        <p:txBody>
+          <a:bodyPr rtlCol="0" anchor="ctr"/>
+          <a:lstStyle/>
+          <a:p>
+            <a:pPr algn="ctr"/>
+            <a:endParaRPr lang="en-US"/>
+          </a:p>
+        </p:txBody>
+      </p:sp>
+      <p:sp>
+        <p:nvSpPr>
+          <p:cNvPr id="11" name="Oval 10"/>
+          <p:cNvSpPr/>
+          <p:nvPr/>
+        </p:nvSpPr>
+        <p:spPr>
+          <a:xfrm>
+            <a:off x="1991538" y="3345909"/>
+            <a:ext cx="228600" cy="228600"/>
+          </a:xfrm>
+          <a:prstGeom prst="ellipse">
+            <a:avLst/>
+          </a:prstGeom>
+        </p:spPr>
+        <p:style>
+          <a:lnRef idx="2">
+            <a:schemeClr val="accent1">
+              <a:shade val="50000"/>
+            </a:schemeClr>
+          </a:lnRef>
+          <a:fillRef idx="1">
+            <a:schemeClr val="accent1"/>
+          </a:fillRef>
+          <a:effectRef idx="0">
+            <a:schemeClr val="accent1"/>
+          </a:effectRef>
+          <a:fontRef idx="minor">
+            <a:schemeClr val="lt1"/>
+          </a:fontRef>
+        </p:style>
+        <p:txBody>
+          <a:bodyPr rtlCol="0" anchor="ctr"/>
+          <a:lstStyle/>
+          <a:p>
+            <a:pPr algn="ctr"/>
+            <a:endParaRPr lang="en-US"/>
+          </a:p>
+        </p:txBody>
+      </p:sp>
+      <p:sp>
+        <p:nvSpPr>
+          <p:cNvPr id="12" name="Oval 11"/>
+          <p:cNvSpPr/>
+          <p:nvPr/>
+        </p:nvSpPr>
+        <p:spPr>
+          <a:xfrm>
+            <a:off x="3337487" y="3345909"/>
+            <a:ext cx="228600" cy="228600"/>
+          </a:xfrm>
+          <a:prstGeom prst="ellipse">
+            <a:avLst/>
+          </a:prstGeom>
+        </p:spPr>
+        <p:style>
+          <a:lnRef idx="2">
+            <a:schemeClr val="accent1">
+              <a:shade val="50000"/>
+            </a:schemeClr>
+          </a:lnRef>
+          <a:fillRef idx="1">
+            <a:schemeClr val="accent1"/>
+          </a:fillRef>
+          <a:effectRef idx="0">
+            <a:schemeClr val="accent1"/>
+          </a:effectRef>
+          <a:fontRef idx="minor">
+            <a:schemeClr val="lt1"/>
+          </a:fontRef>
+        </p:style>
+        <p:txBody>
+          <a:bodyPr rtlCol="0" anchor="ctr"/>
+          <a:lstStyle/>
+          <a:p>
+            <a:pPr algn="ctr"/>
+            <a:endParaRPr lang="en-US"/>
+          </a:p>
+        </p:txBody>
+      </p:sp>
+      <p:sp>
+        <p:nvSpPr>
+          <p:cNvPr id="13" name="Oval 12"/>
+          <p:cNvSpPr/>
+          <p:nvPr/>
+        </p:nvSpPr>
+        <p:spPr>
+          <a:xfrm>
+            <a:off x="4747187" y="3371671"/>
+            <a:ext cx="228600" cy="228600"/>
+          </a:xfrm>
+          <a:prstGeom prst="ellipse">
+            <a:avLst/>
+          </a:prstGeom>
+        </p:spPr>
+        <p:style>
+          <a:lnRef idx="2">
+            <a:schemeClr val="accent1">
+              <a:shade val="50000"/>
+            </a:schemeClr>
+          </a:lnRef>
+          <a:fillRef idx="1">
+            <a:schemeClr val="accent1"/>
+          </a:fillRef>
+          <a:effectRef idx="0">
+            <a:schemeClr val="accent1"/>
+          </a:effectRef>
+          <a:fontRef idx="minor">
+            <a:schemeClr val="lt1"/>
+          </a:fontRef>
+        </p:style>
+        <p:txBody>
+          <a:bodyPr rtlCol="0" anchor="ctr"/>
+          <a:lstStyle/>
+          <a:p>
+            <a:pPr algn="ctr"/>
+            <a:endParaRPr lang="en-US"/>
+          </a:p>
+        </p:txBody>
+      </p:sp>
+      <p:sp>
+        <p:nvSpPr>
+          <p:cNvPr id="14" name="TextBox 13"/>
+          <p:cNvSpPr txBox="1"/>
+          <p:nvPr/>
+        </p:nvSpPr>
+        <p:spPr>
+          <a:xfrm>
+            <a:off x="6041833" y="3301305"/>
+            <a:ext cx="849656" cy="369332"/>
+          </a:xfrm>
+          <a:prstGeom prst="rect">
+            <a:avLst/>
+          </a:prstGeom>
+          <a:noFill/>
+        </p:spPr>
+        <p:txBody>
+          <a:bodyPr wrap="none" rtlCol="0">
+            <a:spAutoFit/>
+          </a:bodyPr>
+          <a:lstStyle/>
+          <a:p>
+            <a:r>
+              <a:rPr lang="en-US" dirty="0" smtClean="0"/>
+              <a:t>Master</a:t>
+            </a:r>
+            <a:endParaRPr lang="en-US" dirty="0"/>
+          </a:p>
+        </p:txBody>
+      </p:sp>
+      <p:cxnSp>
+        <p:nvCxnSpPr>
+          <p:cNvPr id="16" name="Straight Arrow Connector 15"/>
+          <p:cNvCxnSpPr>
+            <a:endCxn id="13" idx="3"/>
+          </p:cNvCxnSpPr>
+          <p:nvPr/>
+        </p:nvCxnSpPr>
+        <p:spPr>
+          <a:xfrm flipV="1">
+            <a:off x="4008268" y="3566793"/>
+            <a:ext cx="772397" cy="654296"/>
+          </a:xfrm>
+          <a:prstGeom prst="straightConnector1">
+            <a:avLst/>
+          </a:prstGeom>
+          <a:ln w="76200">
+            <a:tailEnd type="triangle"/>
+          </a:ln>
+        </p:spPr>
+        <p:style>
+          <a:lnRef idx="1">
+            <a:schemeClr val="accent6"/>
+          </a:lnRef>
+          <a:fillRef idx="0">
+            <a:schemeClr val="accent6"/>
+          </a:fillRef>
+          <a:effectRef idx="0">
+            <a:schemeClr val="accent6"/>
+          </a:effectRef>
+          <a:fontRef idx="minor">
+            <a:schemeClr val="tx1"/>
+          </a:fontRef>
+        </p:style>
+      </p:cxnSp>
+      <p:sp>
+        <p:nvSpPr>
+          <p:cNvPr id="17" name="Oval 16"/>
+          <p:cNvSpPr/>
+          <p:nvPr/>
+        </p:nvSpPr>
+        <p:spPr>
+          <a:xfrm>
+            <a:off x="3026498" y="4106789"/>
+            <a:ext cx="228600" cy="228600"/>
+          </a:xfrm>
+          <a:prstGeom prst="ellipse">
+            <a:avLst/>
+          </a:prstGeom>
+        </p:spPr>
+        <p:style>
+          <a:lnRef idx="2">
+            <a:schemeClr val="accent6">
+              <a:shade val="50000"/>
+            </a:schemeClr>
+          </a:lnRef>
+          <a:fillRef idx="1">
+            <a:schemeClr val="accent6"/>
+          </a:fillRef>
+          <a:effectRef idx="0">
+            <a:schemeClr val="accent6"/>
+          </a:effectRef>
+          <a:fontRef idx="minor">
+            <a:schemeClr val="lt1"/>
+          </a:fontRef>
+        </p:style>
+        <p:txBody>
+          <a:bodyPr rtlCol="0" anchor="ctr"/>
+          <a:lstStyle/>
+          <a:p>
+            <a:pPr algn="ctr"/>
+            <a:endParaRPr lang="en-US"/>
+          </a:p>
+        </p:txBody>
+      </p:sp>
+      <p:sp>
+        <p:nvSpPr>
+          <p:cNvPr id="18" name="TextBox 17"/>
+          <p:cNvSpPr txBox="1"/>
+          <p:nvPr/>
+        </p:nvSpPr>
+        <p:spPr>
+          <a:xfrm>
+            <a:off x="5105401" y="4459754"/>
+            <a:ext cx="1343445" cy="369332"/>
+          </a:xfrm>
+          <a:prstGeom prst="rect">
+            <a:avLst/>
+          </a:prstGeom>
+          <a:noFill/>
+        </p:spPr>
+        <p:txBody>
+          <a:bodyPr wrap="none" rtlCol="0">
+            <a:spAutoFit/>
+          </a:bodyPr>
+          <a:lstStyle/>
+          <a:p>
+            <a:r>
+              <a:rPr lang="en-US" dirty="0" smtClean="0"/>
+              <a:t>Pull Request</a:t>
+            </a:r>
+            <a:endParaRPr lang="en-US" dirty="0"/>
+          </a:p>
+        </p:txBody>
+      </p:sp>
+      <p:sp>
+        <p:nvSpPr>
+          <p:cNvPr id="19" name="Oval 18"/>
+          <p:cNvSpPr/>
+          <p:nvPr/>
+        </p:nvSpPr>
+        <p:spPr>
+          <a:xfrm>
+            <a:off x="3832137" y="4106789"/>
+            <a:ext cx="228600" cy="228600"/>
+          </a:xfrm>
+          <a:prstGeom prst="ellipse">
+            <a:avLst/>
+          </a:prstGeom>
+        </p:spPr>
+        <p:style>
+          <a:lnRef idx="2">
+            <a:schemeClr val="accent6">
+              <a:shade val="50000"/>
+            </a:schemeClr>
+          </a:lnRef>
+          <a:fillRef idx="1">
+            <a:schemeClr val="accent6"/>
+          </a:fillRef>
+          <a:effectRef idx="0">
+            <a:schemeClr val="accent6"/>
+          </a:effectRef>
+          <a:fontRef idx="minor">
+            <a:schemeClr val="lt1"/>
+          </a:fontRef>
+        </p:style>
+        <p:txBody>
+          <a:bodyPr rtlCol="0" anchor="ctr"/>
+          <a:lstStyle/>
+          <a:p>
+            <a:pPr algn="ctr"/>
+            <a:endParaRPr lang="en-US"/>
+          </a:p>
+        </p:txBody>
+      </p:sp>
+      <p:cxnSp>
+        <p:nvCxnSpPr>
+          <p:cNvPr id="22" name="Straight Arrow Connector 21"/>
+          <p:cNvCxnSpPr/>
+          <p:nvPr/>
+        </p:nvCxnSpPr>
+        <p:spPr>
+          <a:xfrm flipH="1" flipV="1">
+            <a:off x="4394466" y="3992489"/>
+            <a:ext cx="710935" cy="655711"/>
+          </a:xfrm>
+          <a:prstGeom prst="straightConnector1">
+            <a:avLst/>
+          </a:prstGeom>
+          <a:ln w="38100">
+            <a:tailEnd type="triangle"/>
+          </a:ln>
+        </p:spPr>
+        <p:style>
+          <a:lnRef idx="1">
+            <a:schemeClr val="dk1"/>
+          </a:lnRef>
+          <a:fillRef idx="0">
+            <a:schemeClr val="dk1"/>
+          </a:fillRef>
+          <a:effectRef idx="0">
+            <a:schemeClr val="dk1"/>
+          </a:effectRef>
+          <a:fontRef idx="minor">
+            <a:schemeClr val="tx1"/>
+          </a:fontRef>
+        </p:style>
+      </p:cxnSp>
+      <p:sp>
+        <p:nvSpPr>
+          <p:cNvPr id="23" name="TextBox 22"/>
+          <p:cNvSpPr txBox="1"/>
+          <p:nvPr/>
+        </p:nvSpPr>
+        <p:spPr>
+          <a:xfrm>
+            <a:off x="3079832" y="4299582"/>
+            <a:ext cx="837152" cy="369332"/>
+          </a:xfrm>
+          <a:prstGeom prst="rect">
+            <a:avLst/>
+          </a:prstGeom>
+          <a:noFill/>
+        </p:spPr>
+        <p:txBody>
+          <a:bodyPr wrap="none" rtlCol="0">
+            <a:spAutoFit/>
+          </a:bodyPr>
+          <a:lstStyle/>
+          <a:p>
+            <a:r>
+              <a:rPr lang="en-US" dirty="0" smtClean="0"/>
+              <a:t>Branch</a:t>
+            </a:r>
+            <a:endParaRPr lang="en-US" dirty="0"/>
+          </a:p>
+        </p:txBody>
+      </p:sp>
+      <p:sp>
+        <p:nvSpPr>
+          <p:cNvPr id="3" name="TextBox 2"/>
+          <p:cNvSpPr txBox="1"/>
+          <p:nvPr/>
+        </p:nvSpPr>
+        <p:spPr>
+          <a:xfrm>
+            <a:off x="323662" y="5596147"/>
+            <a:ext cx="8465651" cy="369332"/>
+          </a:xfrm>
+          <a:prstGeom prst="rect">
+            <a:avLst/>
+          </a:prstGeom>
+          <a:noFill/>
+        </p:spPr>
+        <p:txBody>
+          <a:bodyPr wrap="none" rtlCol="0">
+            <a:spAutoFit/>
+          </a:bodyPr>
+          <a:lstStyle/>
+          <a:p>
+            <a:r>
+              <a:rPr lang="en-US" dirty="0" smtClean="0"/>
+              <a:t>Pull Requests can cause conflicts, but GitHub makes it relatively easy to resolve them.  </a:t>
+            </a:r>
+            <a:endParaRPr lang="en-US" dirty="0"/>
+          </a:p>
+        </p:txBody>
+      </p:sp>
+    </p:spTree>
+    <p:extLst>
+      <p:ext uri="{BB962C8B-B14F-4D97-AF65-F5344CB8AC3E}">
+        <p14:creationId xmlns:p14="http://schemas.microsoft.com/office/powerpoint/2010/main" val="3047772038"/>
+      </p:ext>
+    </p:extLst>
+  </p:cSld>
+  <p:clrMapOvr>
+    <a:masterClrMapping/>
+  </p:clrMapOvr>
+  <p:timing>
+    <p:tnLst>
+      <p:par>
+        <p:cTn id="1" dur="indefinite" restart="never" nodeType="tmRoot"/>
+      </p:par>
+    </p:tnLst>
+  </p:timing>
+</p:sld>
+</file>
+
+<file path=ppt/slides/slide15.xml><?xml version="1.0" encoding="utf-8"?>
+<p:sld xmlns:a="http://schemas.openxmlformats.org/drawingml/2006/main" xmlns:r="http://schemas.openxmlformats.org/officeDocument/2006/relationships" xmlns:p="http://schemas.openxmlformats.org/presentationml/2006/main">
+  <p:cSld>
+    <p:bg>
+      <p:bgPr>
+        <a:solidFill>
+          <a:schemeClr val="bg1">
+            <a:lumMod val="65000"/>
+          </a:schemeClr>
+        </a:solidFill>
+        <a:effectLst/>
+      </p:bgPr>
+    </p:bg>
+    <p:spTree>
+      <p:nvGrpSpPr>
+        <p:cNvPr id="1" name=""/>
+        <p:cNvGrpSpPr/>
+        <p:nvPr/>
+      </p:nvGrpSpPr>
+      <p:grpSpPr>
+        <a:xfrm>
+          <a:off x="0" y="0"/>
+          <a:ext cx="0" cy="0"/>
+          <a:chOff x="0" y="0"/>
+          <a:chExt cx="0" cy="0"/>
+        </a:xfrm>
+      </p:grpSpPr>
+      <p:sp>
+        <p:nvSpPr>
+          <p:cNvPr id="5" name="Rectangle 4"/>
+          <p:cNvSpPr/>
+          <p:nvPr/>
+        </p:nvSpPr>
+        <p:spPr>
+          <a:xfrm>
+            <a:off x="0" y="6172200"/>
+            <a:ext cx="9144000" cy="685800"/>
+          </a:xfrm>
+          <a:prstGeom prst="rect">
+            <a:avLst/>
+          </a:prstGeom>
+          <a:gradFill>
+            <a:gsLst>
+              <a:gs pos="0">
+                <a:schemeClr val="bg1"/>
+              </a:gs>
+              <a:gs pos="100000">
+                <a:schemeClr val="bg1">
+                  <a:alpha val="0"/>
+                </a:schemeClr>
+              </a:gs>
+            </a:gsLst>
+            <a:lin ang="10800000" scaled="0"/>
+          </a:gradFill>
+          <a:ln>
+            <a:noFill/>
+          </a:ln>
+        </p:spPr>
+        <p:style>
+          <a:lnRef idx="2">
+            <a:schemeClr val="accent1">
+              <a:shade val="50000"/>
+            </a:schemeClr>
+          </a:lnRef>
+          <a:fillRef idx="1">
+            <a:schemeClr val="accent1"/>
+          </a:fillRef>
+          <a:effectRef idx="0">
+            <a:schemeClr val="accent1"/>
+          </a:effectRef>
+          <a:fontRef idx="minor">
+            <a:schemeClr val="lt1"/>
+          </a:fontRef>
+        </p:style>
+        <p:txBody>
+          <a:bodyPr rtlCol="0" anchor="ctr"/>
+          <a:lstStyle/>
+          <a:p>
+            <a:pPr algn="ctr"/>
+            <a:endParaRPr lang="en-US"/>
+          </a:p>
+        </p:txBody>
+      </p:sp>
+      <p:sp>
+        <p:nvSpPr>
+          <p:cNvPr id="2" name="Title 1"/>
+          <p:cNvSpPr>
+            <a:spLocks noGrp="1"/>
+          </p:cNvSpPr>
+          <p:nvPr>
+            <p:ph type="title"/>
+          </p:nvPr>
+        </p:nvSpPr>
+        <p:spPr/>
+        <p:txBody>
+          <a:bodyPr/>
+          <a:lstStyle/>
+          <a:p>
+            <a:pPr algn="l"/>
+            <a:r>
+              <a:rPr lang="en-US" dirty="0" smtClean="0">
+                <a:solidFill>
+                  <a:schemeClr val="accent1">
+                    <a:lumMod val="50000"/>
+                  </a:schemeClr>
+                </a:solidFill>
+              </a:rPr>
+              <a:t>[pull request demo]</a:t>
+            </a:r>
+            <a:endParaRPr lang="en-US" dirty="0">
+              <a:solidFill>
+                <a:schemeClr val="accent1">
+                  <a:lumMod val="50000"/>
+                </a:schemeClr>
+              </a:solidFill>
+            </a:endParaRPr>
+          </a:p>
+        </p:txBody>
+      </p:sp>
+      <p:sp>
+        <p:nvSpPr>
+          <p:cNvPr id="3" name="Content Placeholder 2"/>
+          <p:cNvSpPr>
+            <a:spLocks noGrp="1"/>
+          </p:cNvSpPr>
+          <p:nvPr>
+            <p:ph idx="1"/>
+          </p:nvPr>
+        </p:nvSpPr>
+        <p:spPr/>
+        <p:txBody>
+          <a:bodyPr/>
+          <a:lstStyle/>
+          <a:p>
+            <a:r>
+              <a:rPr lang="en-US" dirty="0" smtClean="0"/>
+              <a:t>Click Pull Request in Desktop</a:t>
+            </a:r>
+          </a:p>
+          <a:p>
+            <a:r>
+              <a:rPr lang="en-US" dirty="0" smtClean="0"/>
+              <a:t>Make sure you are merging to Master</a:t>
+            </a:r>
+          </a:p>
+          <a:p>
+            <a:r>
+              <a:rPr lang="en-US" dirty="0" smtClean="0"/>
+              <a:t>Leave a note</a:t>
+            </a:r>
+          </a:p>
+          <a:p>
+            <a:r>
+              <a:rPr lang="en-US" dirty="0" smtClean="0"/>
+              <a:t>Check to see if there will be issues. If there will be issues, you’ll need to resolve them later in GitHub. (We won’t have time to go into this).</a:t>
+            </a:r>
+          </a:p>
+          <a:p>
+            <a:r>
+              <a:rPr lang="en-US" dirty="0" smtClean="0"/>
+              <a:t>Click Send Pull Request.</a:t>
+            </a:r>
+          </a:p>
+          <a:p>
+            <a:r>
+              <a:rPr lang="en-US" dirty="0" smtClean="0"/>
+              <a:t>Go into GitHub and see what we’ve done.</a:t>
+            </a:r>
+          </a:p>
+          <a:p>
+            <a:endParaRPr lang="en-US" dirty="0" smtClean="0"/>
+          </a:p>
+          <a:p>
+            <a:endParaRPr lang="en-US" dirty="0" smtClean="0"/>
+          </a:p>
+        </p:txBody>
+      </p:sp>
+      <p:pic>
+        <p:nvPicPr>
+          <p:cNvPr id="2050" name="Picture 2" descr="D:\data\market\3_logo\LTIlogo_object.png"/>
+          <p:cNvPicPr>
+            <a:picLocks noChangeAspect="1" noChangeArrowheads="1"/>
+          </p:cNvPicPr>
+          <p:nvPr/>
+        </p:nvPicPr>
+        <p:blipFill>
+          <a:blip r:embed="rId3" cstate="print"/>
+          <a:srcRect l="28571" t="23077" r="27473" b="23077"/>
+          <a:stretch>
+            <a:fillRect/>
+          </a:stretch>
+        </p:blipFill>
+        <p:spPr bwMode="auto">
+          <a:xfrm>
+            <a:off x="8077200" y="5943600"/>
+            <a:ext cx="990600" cy="866775"/>
+          </a:xfrm>
+          <a:prstGeom prst="rect">
+            <a:avLst/>
+          </a:prstGeom>
+          <a:noFill/>
+          <a:effectLst>
+            <a:outerShdw blurRad="50800" dist="38100" dir="2700000" algn="tl" rotWithShape="0">
+              <a:prstClr val="black">
+                <a:alpha val="40000"/>
+              </a:prstClr>
+            </a:outerShdw>
+          </a:effectLst>
+        </p:spPr>
+      </p:pic>
+      <p:sp>
+        <p:nvSpPr>
+          <p:cNvPr id="8" name="Slide Number Placeholder 7"/>
+          <p:cNvSpPr txBox="1">
+            <a:spLocks/>
+          </p:cNvSpPr>
+          <p:nvPr/>
+        </p:nvSpPr>
+        <p:spPr>
+          <a:xfrm>
+            <a:off x="5791200" y="6324600"/>
+            <a:ext cx="2133600" cy="365125"/>
+          </a:xfrm>
+          <a:prstGeom prst="rect">
+            <a:avLst/>
+          </a:prstGeom>
+        </p:spPr>
+        <p:txBody>
+          <a:bodyPr vert="horz" lIns="91440" tIns="45720" rIns="91440" bIns="45720" rtlCol="0" anchor="ctr"/>
+          <a:lstStyle/>
+          <a:p>
+            <a:pPr marL="0" marR="0" lvl="0" indent="0" algn="r" defTabSz="914400" rtl="0" eaLnBrk="1" fontAlgn="auto" latinLnBrk="0" hangingPunct="1">
+              <a:lnSpc>
+                <a:spcPct val="100000"/>
+              </a:lnSpc>
+              <a:spcBef>
+                <a:spcPts val="0"/>
+              </a:spcBef>
+              <a:spcAft>
+                <a:spcPts val="0"/>
+              </a:spcAft>
+              <a:buClrTx/>
+              <a:buSzTx/>
+              <a:buFontTx/>
+              <a:buNone/>
+              <a:tabLst/>
+              <a:defRPr/>
+            </a:pPr>
+            <a:r>
+              <a:rPr kumimoji="0" lang="en-US" sz="1400" b="0" i="0" u="none" strike="noStrike" kern="1200" cap="none" spc="0" normalizeH="0" baseline="0" noProof="0" dirty="0" smtClean="0">
+                <a:ln>
+                  <a:noFill/>
+                </a:ln>
+                <a:solidFill>
+                  <a:schemeClr val="accent3">
+                    <a:lumMod val="50000"/>
+                  </a:schemeClr>
+                </a:solidFill>
+                <a:effectLst/>
+                <a:uLnTx/>
+                <a:uFillTx/>
+                <a:latin typeface="+mn-lt"/>
+                <a:ea typeface="+mn-ea"/>
+                <a:cs typeface="+mn-cs"/>
+              </a:rPr>
+              <a:t>SLIDE </a:t>
+            </a:r>
+            <a:fld id="{C04375EB-5169-4238-8270-5D5536267021}" type="slidenum">
+              <a:rPr kumimoji="0" lang="en-US" sz="1400" b="0" i="0" u="none" strike="noStrike" kern="1200" cap="none" spc="0" normalizeH="0" baseline="0" noProof="0" smtClean="0">
+                <a:ln>
+                  <a:noFill/>
+                </a:ln>
+                <a:solidFill>
+                  <a:schemeClr val="accent3">
+                    <a:lumMod val="50000"/>
+                  </a:schemeClr>
+                </a:solidFill>
+                <a:effectLst/>
+                <a:uLnTx/>
+                <a:uFillTx/>
+                <a:latin typeface="+mn-lt"/>
+                <a:ea typeface="+mn-ea"/>
+                <a:cs typeface="+mn-cs"/>
+              </a:rPr>
+              <a:pPr marL="0" marR="0" lvl="0" indent="0" algn="r" defTabSz="914400" rtl="0" eaLnBrk="1" fontAlgn="auto" latinLnBrk="0" hangingPunct="1">
+                <a:lnSpc>
+                  <a:spcPct val="100000"/>
+                </a:lnSpc>
+                <a:spcBef>
+                  <a:spcPts val="0"/>
+                </a:spcBef>
+                <a:spcAft>
+                  <a:spcPts val="0"/>
+                </a:spcAft>
+                <a:buClrTx/>
+                <a:buSzTx/>
+                <a:buFontTx/>
+                <a:buNone/>
+                <a:tabLst/>
+                <a:defRPr/>
+              </a:pPr>
+              <a:t>15</a:t>
+            </a:fld>
+            <a:endParaRPr kumimoji="0" lang="en-US" sz="1400" b="0" i="0" u="none" strike="noStrike" kern="1200" cap="none" spc="0" normalizeH="0" baseline="0" noProof="0" dirty="0">
+              <a:ln>
+                <a:noFill/>
+              </a:ln>
+              <a:solidFill>
+                <a:schemeClr val="accent3">
+                  <a:lumMod val="50000"/>
+                </a:schemeClr>
+              </a:solidFill>
+              <a:effectLst/>
+              <a:uLnTx/>
+              <a:uFillTx/>
+              <a:latin typeface="+mn-lt"/>
+              <a:ea typeface="+mn-ea"/>
+              <a:cs typeface="+mn-cs"/>
+            </a:endParaRPr>
+          </a:p>
+        </p:txBody>
+      </p:sp>
+    </p:spTree>
+    <p:extLst>
+      <p:ext uri="{BB962C8B-B14F-4D97-AF65-F5344CB8AC3E}">
+        <p14:creationId xmlns:p14="http://schemas.microsoft.com/office/powerpoint/2010/main" val="698112444"/>
+      </p:ext>
+    </p:extLst>
+  </p:cSld>
+  <p:clrMapOvr>
+    <a:masterClrMapping/>
+  </p:clrMapOvr>
+  <p:timing>
+    <p:tnLst>
+      <p:par>
+        <p:cTn id="1" dur="indefinite" restart="never" nodeType="tmRoot"/>
+      </p:par>
+    </p:tnLst>
+  </p:timing>
+</p:sld>
+</file>
+
+<file path=ppt/slides/slide16.xml><?xml version="1.0" encoding="utf-8"?>
+<p:sld xmlns:a="http://schemas.openxmlformats.org/drawingml/2006/main" xmlns:r="http://schemas.openxmlformats.org/officeDocument/2006/relationships" xmlns:p="http://schemas.openxmlformats.org/presentationml/2006/main">
+  <p:cSld>
+    <p:spTree>
+      <p:nvGrpSpPr>
+        <p:cNvPr id="1" name=""/>
+        <p:cNvGrpSpPr/>
+        <p:nvPr/>
+      </p:nvGrpSpPr>
+      <p:grpSpPr>
+        <a:xfrm>
+          <a:off x="0" y="0"/>
+          <a:ext cx="0" cy="0"/>
+          <a:chOff x="0" y="0"/>
+          <a:chExt cx="0" cy="0"/>
+        </a:xfrm>
+      </p:grpSpPr>
+      <p:sp>
+        <p:nvSpPr>
+          <p:cNvPr id="2" name="Title 1"/>
+          <p:cNvSpPr>
+            <a:spLocks noGrp="1"/>
+          </p:cNvSpPr>
+          <p:nvPr>
+            <p:ph type="title"/>
+          </p:nvPr>
+        </p:nvSpPr>
+        <p:spPr/>
+        <p:txBody>
+          <a:bodyPr/>
+          <a:lstStyle/>
+          <a:p>
+            <a:endParaRPr lang="en-US"/>
+          </a:p>
+        </p:txBody>
+      </p:sp>
+      <p:sp>
+        <p:nvSpPr>
+          <p:cNvPr id="3" name="Content Placeholder 2"/>
+          <p:cNvSpPr>
+            <a:spLocks noGrp="1"/>
+          </p:cNvSpPr>
+          <p:nvPr>
+            <p:ph idx="1"/>
+          </p:nvPr>
+        </p:nvSpPr>
+        <p:spPr/>
+        <p:txBody>
+          <a:bodyPr/>
+          <a:lstStyle/>
+          <a:p>
             <a:endParaRPr lang="en-US"/>
           </a:p>
         </p:txBody>
@@ -5742,7 +7600,99 @@
             <a:fld id="{C04375EB-5169-4238-8270-5D5536267021}" type="slidenum">
               <a:rPr lang="en-US" smtClean="0"/>
               <a:pPr/>
-              <a:t>13</a:t>
+              <a:t>16</a:t>
+            </a:fld>
+            <a:endParaRPr lang="en-US"/>
+          </a:p>
+        </p:txBody>
+      </p:sp>
+    </p:spTree>
+    <p:extLst>
+      <p:ext uri="{BB962C8B-B14F-4D97-AF65-F5344CB8AC3E}">
+        <p14:creationId xmlns:p14="http://schemas.microsoft.com/office/powerpoint/2010/main" val="1153571816"/>
+      </p:ext>
+    </p:extLst>
+  </p:cSld>
+  <p:clrMapOvr>
+    <a:masterClrMapping/>
+  </p:clrMapOvr>
+</p:sld>
+</file>
+
+<file path=ppt/slides/slide17.xml><?xml version="1.0" encoding="utf-8"?>
+<p:sld xmlns:a="http://schemas.openxmlformats.org/drawingml/2006/main" xmlns:r="http://schemas.openxmlformats.org/officeDocument/2006/relationships" xmlns:p="http://schemas.openxmlformats.org/presentationml/2006/main">
+  <p:cSld>
+    <p:spTree>
+      <p:nvGrpSpPr>
+        <p:cNvPr id="1" name=""/>
+        <p:cNvGrpSpPr/>
+        <p:nvPr/>
+      </p:nvGrpSpPr>
+      <p:grpSpPr>
+        <a:xfrm>
+          <a:off x="0" y="0"/>
+          <a:ext cx="0" cy="0"/>
+          <a:chOff x="0" y="0"/>
+          <a:chExt cx="0" cy="0"/>
+        </a:xfrm>
+      </p:grpSpPr>
+      <p:sp>
+        <p:nvSpPr>
+          <p:cNvPr id="2" name="Title 1"/>
+          <p:cNvSpPr>
+            <a:spLocks noGrp="1"/>
+          </p:cNvSpPr>
+          <p:nvPr>
+            <p:ph type="title"/>
+          </p:nvPr>
+        </p:nvSpPr>
+        <p:spPr/>
+        <p:txBody>
+          <a:bodyPr/>
+          <a:lstStyle/>
+          <a:p>
+            <a:endParaRPr lang="en-US"/>
+          </a:p>
+        </p:txBody>
+      </p:sp>
+      <p:sp>
+        <p:nvSpPr>
+          <p:cNvPr id="3" name="Content Placeholder 2"/>
+          <p:cNvSpPr>
+            <a:spLocks noGrp="1"/>
+          </p:cNvSpPr>
+          <p:nvPr>
+            <p:ph idx="1"/>
+          </p:nvPr>
+        </p:nvSpPr>
+        <p:spPr/>
+        <p:txBody>
+          <a:bodyPr/>
+          <a:lstStyle/>
+          <a:p>
+            <a:endParaRPr lang="en-US"/>
+          </a:p>
+        </p:txBody>
+      </p:sp>
+      <p:sp>
+        <p:nvSpPr>
+          <p:cNvPr id="4" name="Slide Number Placeholder 3"/>
+          <p:cNvSpPr>
+            <a:spLocks noGrp="1"/>
+          </p:cNvSpPr>
+          <p:nvPr>
+            <p:ph type="sldNum" sz="quarter" idx="12"/>
+          </p:nvPr>
+        </p:nvSpPr>
+        <p:spPr/>
+        <p:txBody>
+          <a:bodyPr/>
+          <a:lstStyle/>
+          <a:p>
+            <a:fld id="{C04375EB-5169-4238-8270-5D5536267021}" type="slidenum">
+              <a:rPr lang="en-US" smtClean="0"/>
+              <a:pPr/>
+              <a:t>17</a:t>
             </a:fld>
             <a:endParaRPr lang="en-US"/>
           </a:p>
@@ -6055,7 +8005,7 @@
         </p:spPr>
         <p:txBody>
           <a:bodyPr vert="horz" lIns="91440" tIns="45720" rIns="91440" bIns="45720" rtlCol="0">
-            <a:normAutofit fontScale="92500" lnSpcReduction="10000"/>
+            <a:normAutofit/>
           </a:bodyPr>
           <a:lstStyle>
             <a:lvl1pPr marL="342900" indent="-342900" algn="l" defTabSz="914400" rtl="0" eaLnBrk="1" latinLnBrk="0" hangingPunct="1">
@@ -6239,16 +8189,6 @@
               <a:t>Commit</a:t>
             </a:r>
           </a:p>
-          <a:p>
-            <a:pPr marL="0" indent="0" algn="ctr">
-              <a:buNone/>
-            </a:pPr>
-            <a:r>
-              <a:rPr lang="en-US" dirty="0" smtClean="0"/>
-              <a:t>Publish</a:t>
-            </a:r>
-            <a:endParaRPr lang="en-US" dirty="0"/>
-          </a:p>
         </p:txBody>
       </p:sp>
       <p:pic>
@@ -9478,7 +11418,7 @@
         <p:spPr>
           <a:xfrm>
             <a:off x="304800" y="1664345"/>
-            <a:ext cx="8305800" cy="646331"/>
+            <a:ext cx="8305800" cy="1200329"/>
           </a:xfrm>
           <a:prstGeom prst="rect">
             <a:avLst/>
@@ -9505,7 +11445,7 @@
             </a:r>
             <a:r>
               <a:rPr lang="en-US" dirty="0" smtClean="0"/>
-              <a:t>branch.</a:t>
+              <a:t>branch. Other people may continue working on the Master branch. If you screw up, you can always go back to the master. Branches are cheap! Branch early and often.</a:t>
             </a:r>
             <a:endParaRPr lang="en-US" b="1" dirty="0"/>
           </a:p>

</xml_diff>

<commit_message>
more edits to powerpoint
</commit_message>
<xml_diff>
--- a/GitHub_Steve.pptx
+++ b/GitHub_Steve.pptx
@@ -5,7 +5,7 @@
     <p:sldMasterId id="2147483648" r:id="rId1"/>
   </p:sldMasterIdLst>
   <p:notesMasterIdLst>
-    <p:notesMasterId r:id="rId19"/>
+    <p:notesMasterId r:id="rId18"/>
   </p:notesMasterIdLst>
   <p:sldIdLst>
     <p:sldId id="256" r:id="rId2"/>
@@ -23,8 +23,7 @@
     <p:sldId id="271" r:id="rId14"/>
     <p:sldId id="272" r:id="rId15"/>
     <p:sldId id="273" r:id="rId16"/>
-    <p:sldId id="270" r:id="rId17"/>
-    <p:sldId id="261" r:id="rId18"/>
+    <p:sldId id="274" r:id="rId17"/>
   </p:sldIdLst>
   <p:sldSz cx="9144000" cy="6858000" type="screen4x3"/>
   <p:notesSz cx="6858000" cy="9144000"/>
@@ -577,6 +576,98 @@
     <p:extLst>
       <p:ext uri="{BB962C8B-B14F-4D97-AF65-F5344CB8AC3E}">
         <p14:creationId xmlns:p14="http://schemas.microsoft.com/office/powerpoint/2010/main" val="1669373434"/>
+      </p:ext>
+    </p:extLst>
+  </p:cSld>
+  <p:clrMapOvr>
+    <a:masterClrMapping/>
+  </p:clrMapOvr>
+</p:notes>
+</file>
+
+<file path=ppt/notesSlides/notesSlide10.xml><?xml version="1.0" encoding="utf-8"?>
+<p:notes xmlns:a="http://schemas.openxmlformats.org/drawingml/2006/main" xmlns:r="http://schemas.openxmlformats.org/officeDocument/2006/relationships" xmlns:p="http://schemas.openxmlformats.org/presentationml/2006/main">
+  <p:cSld>
+    <p:spTree>
+      <p:nvGrpSpPr>
+        <p:cNvPr id="1" name=""/>
+        <p:cNvGrpSpPr/>
+        <p:nvPr/>
+      </p:nvGrpSpPr>
+      <p:grpSpPr>
+        <a:xfrm>
+          <a:off x="0" y="0"/>
+          <a:ext cx="0" cy="0"/>
+          <a:chOff x="0" y="0"/>
+          <a:chExt cx="0" cy="0"/>
+        </a:xfrm>
+      </p:grpSpPr>
+      <p:sp>
+        <p:nvSpPr>
+          <p:cNvPr id="2" name="Slide Image Placeholder 1"/>
+          <p:cNvSpPr>
+            <a:spLocks noGrp="1" noRot="1" noChangeAspect="1"/>
+          </p:cNvSpPr>
+          <p:nvPr>
+            <p:ph type="sldImg"/>
+          </p:nvPr>
+        </p:nvSpPr>
+        <p:spPr/>
+      </p:sp>
+      <p:sp>
+        <p:nvSpPr>
+          <p:cNvPr id="3" name="Notes Placeholder 2"/>
+          <p:cNvSpPr>
+            <a:spLocks noGrp="1"/>
+          </p:cNvSpPr>
+          <p:nvPr>
+            <p:ph type="body" idx="1"/>
+          </p:nvPr>
+        </p:nvSpPr>
+        <p:spPr/>
+        <p:txBody>
+          <a:bodyPr/>
+          <a:lstStyle/>
+          <a:p>
+            <a:r>
+              <a:rPr lang="en-US" dirty="0" smtClean="0"/>
+              <a:t>Using Git</a:t>
+            </a:r>
+            <a:r>
+              <a:rPr lang="en-US" baseline="0" dirty="0" smtClean="0"/>
+              <a:t>Hub Desktop. Could also use command line.</a:t>
+            </a:r>
+            <a:endParaRPr lang="en-US" dirty="0"/>
+          </a:p>
+        </p:txBody>
+      </p:sp>
+      <p:sp>
+        <p:nvSpPr>
+          <p:cNvPr id="4" name="Slide Number Placeholder 3"/>
+          <p:cNvSpPr>
+            <a:spLocks noGrp="1"/>
+          </p:cNvSpPr>
+          <p:nvPr>
+            <p:ph type="sldNum" sz="quarter" idx="10"/>
+          </p:nvPr>
+        </p:nvSpPr>
+        <p:spPr/>
+        <p:txBody>
+          <a:bodyPr/>
+          <a:lstStyle/>
+          <a:p>
+            <a:fld id="{330637A4-5A62-4226-AE0F-A6A737EE5607}" type="slidenum">
+              <a:rPr lang="en-US" smtClean="0"/>
+              <a:t>16</a:t>
+            </a:fld>
+            <a:endParaRPr lang="en-US"/>
+          </a:p>
+        </p:txBody>
+      </p:sp>
+    </p:spTree>
+    <p:extLst>
+      <p:ext uri="{BB962C8B-B14F-4D97-AF65-F5344CB8AC3E}">
+        <p14:creationId xmlns:p14="http://schemas.microsoft.com/office/powerpoint/2010/main" val="3938096975"/>
       </p:ext>
     </p:extLst>
   </p:cSld>
@@ -7530,6 +7621,16 @@
 <file path=ppt/slides/slide16.xml><?xml version="1.0" encoding="utf-8"?>
 <p:sld xmlns:a="http://schemas.openxmlformats.org/drawingml/2006/main" xmlns:r="http://schemas.openxmlformats.org/officeDocument/2006/relationships" xmlns:p="http://schemas.openxmlformats.org/presentationml/2006/main">
   <p:cSld>
+    <p:bg>
+      <p:bgPr>
+        <a:solidFill>
+          <a:schemeClr val="bg1">
+            <a:lumMod val="65000"/>
+          </a:schemeClr>
+        </a:solidFill>
+        <a:effectLst/>
+      </p:bgPr>
+    </p:bg>
     <p:spTree>
       <p:nvGrpSpPr>
         <p:cNvPr id="1" name=""/>
@@ -7546,6 +7647,62 @@
       </p:grpSpPr>
       <p:sp>
         <p:nvSpPr>
+          <p:cNvPr id="5" name="Rectangle 4"/>
+          <p:cNvSpPr/>
+          <p:nvPr/>
+        </p:nvSpPr>
+        <p:spPr>
+          <a:xfrm>
+            <a:off x="0" y="6172200"/>
+            <a:ext cx="9144000" cy="685800"/>
+          </a:xfrm>
+          <a:prstGeom prst="rect">
+            <a:avLst/>
+          </a:prstGeom>
+          <a:gradFill>
+            <a:gsLst>
+              <a:gs pos="0">
+                <a:schemeClr val="bg1"/>
+              </a:gs>
+              <a:gs pos="100000">
+                <a:schemeClr val="bg1">
+                  <a:alpha val="0"/>
+                </a:schemeClr>
+              </a:gs>
+            </a:gsLst>
+            <a:lin ang="10800000" scaled="0"/>
+          </a:gradFill>
+          <a:ln>
+            <a:noFill/>
+          </a:ln>
+        </p:spPr>
+        <p:style>
+          <a:lnRef idx="2">
+            <a:schemeClr val="accent1">
+              <a:shade val="50000"/>
+            </a:schemeClr>
+          </a:lnRef>
+          <a:fillRef idx="1">
+            <a:schemeClr val="accent1"/>
+          </a:fillRef>
+          <a:effectRef idx="0">
+            <a:schemeClr val="accent1"/>
+          </a:effectRef>
+          <a:fontRef idx="minor">
+            <a:schemeClr val="lt1"/>
+          </a:fontRef>
+        </p:style>
+        <p:txBody>
+          <a:bodyPr rtlCol="0" anchor="ctr"/>
+          <a:lstStyle/>
+          <a:p>
+            <a:pPr algn="ctr"/>
+            <a:endParaRPr lang="en-US"/>
+          </a:p>
+        </p:txBody>
+      </p:sp>
+      <p:sp>
+        <p:nvSpPr>
           <p:cNvPr id="2" name="Title 1"/>
           <p:cNvSpPr>
             <a:spLocks noGrp="1"/>
@@ -7559,7 +7716,24 @@
           <a:bodyPr/>
           <a:lstStyle/>
           <a:p>
-            <a:endParaRPr lang="en-US"/>
+            <a:pPr algn="l"/>
+            <a:r>
+              <a:rPr lang="en-US" dirty="0" smtClean="0">
+                <a:solidFill>
+                  <a:schemeClr val="accent1">
+                    <a:lumMod val="50000"/>
+                  </a:schemeClr>
+                </a:solidFill>
+              </a:rPr>
+              <a:t>Other Terms</a:t>
+            </a:r>
+            <a:endParaRPr lang="en-US" dirty="0">
+              <a:solidFill>
+                <a:schemeClr val="accent1">
+                  <a:lumMod val="50000"/>
+                </a:schemeClr>
+              </a:solidFill>
+            </a:endParaRPr>
           </a:p>
         </p:txBody>
       </p:sp>
@@ -7578,136 +7752,248 @@
           <a:bodyPr/>
           <a:lstStyle/>
           <a:p>
-            <a:endParaRPr lang="en-US"/>
-          </a:p>
-        </p:txBody>
-      </p:sp>
-      <p:sp>
-        <p:nvSpPr>
-          <p:cNvPr id="4" name="Slide Number Placeholder 3"/>
-          <p:cNvSpPr>
-            <a:spLocks noGrp="1"/>
-          </p:cNvSpPr>
-          <p:nvPr>
-            <p:ph type="sldNum" sz="quarter" idx="12"/>
-          </p:nvPr>
-        </p:nvSpPr>
-        <p:spPr/>
-        <p:txBody>
-          <a:bodyPr/>
-          <a:lstStyle/>
-          <a:p>
+            <a:r>
+              <a:rPr lang="en-US" b="1" dirty="0" smtClean="0"/>
+              <a:t>.</a:t>
+            </a:r>
+            <a:r>
+              <a:rPr lang="en-US" b="1" dirty="0" err="1" smtClean="0"/>
+              <a:t>gitignore</a:t>
+            </a:r>
+            <a:r>
+              <a:rPr lang="en-US" b="1" dirty="0" smtClean="0"/>
+              <a:t> file</a:t>
+            </a:r>
+            <a:r>
+              <a:rPr lang="en-US" dirty="0" smtClean="0"/>
+              <a:t>: list of files that you do not want </a:t>
+            </a:r>
+            <a:r>
+              <a:rPr lang="en-US" dirty="0" err="1" smtClean="0"/>
+              <a:t>Git</a:t>
+            </a:r>
+            <a:r>
+              <a:rPr lang="en-US" dirty="0" smtClean="0"/>
+              <a:t> to track (model output files, compiled files, other binary files).</a:t>
+            </a:r>
+          </a:p>
+          <a:p>
+            <a:r>
+              <a:rPr lang="en-US" b="1" dirty="0" smtClean="0"/>
+              <a:t>Push/Pull/Checkout:</a:t>
+            </a:r>
+            <a:r>
+              <a:rPr lang="en-US" dirty="0" smtClean="0"/>
+              <a:t> GitHub desktop does these commands under the hood when you </a:t>
+            </a:r>
+            <a:r>
+              <a:rPr lang="en-US" b="1" dirty="0" smtClean="0"/>
+              <a:t>sync, publish</a:t>
+            </a:r>
+            <a:r>
+              <a:rPr lang="en-US" dirty="0" smtClean="0"/>
+              <a:t> or change branches.</a:t>
+            </a:r>
+          </a:p>
+          <a:p>
+            <a:r>
+              <a:rPr lang="en-US" b="1" dirty="0" smtClean="0"/>
+              <a:t>Fork: </a:t>
+            </a:r>
+            <a:r>
+              <a:rPr lang="en-US" dirty="0" smtClean="0"/>
+              <a:t>Very similar to </a:t>
+            </a:r>
+            <a:r>
+              <a:rPr lang="en-US" b="1" dirty="0" smtClean="0"/>
+              <a:t>clone</a:t>
+            </a:r>
+            <a:r>
+              <a:rPr lang="en-US" dirty="0" smtClean="0"/>
+              <a:t>.</a:t>
+            </a:r>
+          </a:p>
+          <a:p>
+            <a:r>
+              <a:rPr lang="en-US" b="1" dirty="0" smtClean="0"/>
+              <a:t>Spoon: </a:t>
+            </a:r>
+            <a:r>
+              <a:rPr lang="en-US" dirty="0" smtClean="0"/>
+              <a:t>Kitchen utensil.</a:t>
+            </a:r>
+            <a:endParaRPr lang="en-US" b="1" dirty="0" smtClean="0"/>
+          </a:p>
+          <a:p>
+            <a:endParaRPr lang="en-US" dirty="0" smtClean="0"/>
+          </a:p>
+          <a:p>
+            <a:endParaRPr lang="en-US" dirty="0" smtClean="0"/>
+          </a:p>
+        </p:txBody>
+      </p:sp>
+      <p:pic>
+        <p:nvPicPr>
+          <p:cNvPr id="2050" name="Picture 2" descr="D:\data\market\3_logo\LTIlogo_object.png"/>
+          <p:cNvPicPr>
+            <a:picLocks noChangeAspect="1" noChangeArrowheads="1"/>
+          </p:cNvPicPr>
+          <p:nvPr/>
+        </p:nvPicPr>
+        <p:blipFill>
+          <a:blip r:embed="rId3" cstate="print"/>
+          <a:srcRect l="28571" t="23077" r="27473" b="23077"/>
+          <a:stretch>
+            <a:fillRect/>
+          </a:stretch>
+        </p:blipFill>
+        <p:spPr bwMode="auto">
+          <a:xfrm>
+            <a:off x="8077200" y="5943600"/>
+            <a:ext cx="990600" cy="866775"/>
+          </a:xfrm>
+          <a:prstGeom prst="rect">
+            <a:avLst/>
+          </a:prstGeom>
+          <a:noFill/>
+          <a:effectLst>
+            <a:outerShdw blurRad="50800" dist="38100" dir="2700000" algn="tl" rotWithShape="0">
+              <a:prstClr val="black">
+                <a:alpha val="40000"/>
+              </a:prstClr>
+            </a:outerShdw>
+          </a:effectLst>
+        </p:spPr>
+      </p:pic>
+      <p:sp>
+        <p:nvSpPr>
+          <p:cNvPr id="8" name="Slide Number Placeholder 7"/>
+          <p:cNvSpPr txBox="1">
+            <a:spLocks/>
+          </p:cNvSpPr>
+          <p:nvPr/>
+        </p:nvSpPr>
+        <p:spPr>
+          <a:xfrm>
+            <a:off x="5791200" y="6324600"/>
+            <a:ext cx="2133600" cy="365125"/>
+          </a:xfrm>
+          <a:prstGeom prst="rect">
+            <a:avLst/>
+          </a:prstGeom>
+        </p:spPr>
+        <p:txBody>
+          <a:bodyPr vert="horz" lIns="91440" tIns="45720" rIns="91440" bIns="45720" rtlCol="0" anchor="ctr"/>
+          <a:lstStyle/>
+          <a:p>
+            <a:pPr marL="0" marR="0" lvl="0" indent="0" algn="r" defTabSz="914400" rtl="0" eaLnBrk="1" fontAlgn="auto" latinLnBrk="0" hangingPunct="1">
+              <a:lnSpc>
+                <a:spcPct val="100000"/>
+              </a:lnSpc>
+              <a:spcBef>
+                <a:spcPts val="0"/>
+              </a:spcBef>
+              <a:spcAft>
+                <a:spcPts val="0"/>
+              </a:spcAft>
+              <a:buClrTx/>
+              <a:buSzTx/>
+              <a:buFontTx/>
+              <a:buNone/>
+              <a:tabLst/>
+              <a:defRPr/>
+            </a:pPr>
+            <a:r>
+              <a:rPr kumimoji="0" lang="en-US" sz="1400" b="0" i="0" u="none" strike="noStrike" kern="1200" cap="none" spc="0" normalizeH="0" baseline="0" noProof="0" dirty="0" smtClean="0">
+                <a:ln>
+                  <a:noFill/>
+                </a:ln>
+                <a:solidFill>
+                  <a:schemeClr val="accent3">
+                    <a:lumMod val="50000"/>
+                  </a:schemeClr>
+                </a:solidFill>
+                <a:effectLst/>
+                <a:uLnTx/>
+                <a:uFillTx/>
+                <a:latin typeface="+mn-lt"/>
+                <a:ea typeface="+mn-ea"/>
+                <a:cs typeface="+mn-cs"/>
+              </a:rPr>
+              <a:t>SLIDE </a:t>
+            </a:r>
             <a:fld id="{C04375EB-5169-4238-8270-5D5536267021}" type="slidenum">
-              <a:rPr lang="en-US" smtClean="0"/>
-              <a:pPr/>
+              <a:rPr kumimoji="0" lang="en-US" sz="1400" b="0" i="0" u="none" strike="noStrike" kern="1200" cap="none" spc="0" normalizeH="0" baseline="0" noProof="0" smtClean="0">
+                <a:ln>
+                  <a:noFill/>
+                </a:ln>
+                <a:solidFill>
+                  <a:schemeClr val="accent3">
+                    <a:lumMod val="50000"/>
+                  </a:schemeClr>
+                </a:solidFill>
+                <a:effectLst/>
+                <a:uLnTx/>
+                <a:uFillTx/>
+                <a:latin typeface="+mn-lt"/>
+                <a:ea typeface="+mn-ea"/>
+                <a:cs typeface="+mn-cs"/>
+              </a:rPr>
+              <a:pPr marL="0" marR="0" lvl="0" indent="0" algn="r" defTabSz="914400" rtl="0" eaLnBrk="1" fontAlgn="auto" latinLnBrk="0" hangingPunct="1">
+                <a:lnSpc>
+                  <a:spcPct val="100000"/>
+                </a:lnSpc>
+                <a:spcBef>
+                  <a:spcPts val="0"/>
+                </a:spcBef>
+                <a:spcAft>
+                  <a:spcPts val="0"/>
+                </a:spcAft>
+                <a:buClrTx/>
+                <a:buSzTx/>
+                <a:buFontTx/>
+                <a:buNone/>
+                <a:tabLst/>
+                <a:defRPr/>
+              </a:pPr>
               <a:t>16</a:t>
             </a:fld>
-            <a:endParaRPr lang="en-US"/>
+            <a:endParaRPr kumimoji="0" lang="en-US" sz="1400" b="0" i="0" u="none" strike="noStrike" kern="1200" cap="none" spc="0" normalizeH="0" baseline="0" noProof="0" dirty="0">
+              <a:ln>
+                <a:noFill/>
+              </a:ln>
+              <a:solidFill>
+                <a:schemeClr val="accent3">
+                  <a:lumMod val="50000"/>
+                </a:schemeClr>
+              </a:solidFill>
+              <a:effectLst/>
+              <a:uLnTx/>
+              <a:uFillTx/>
+              <a:latin typeface="+mn-lt"/>
+              <a:ea typeface="+mn-ea"/>
+              <a:cs typeface="+mn-cs"/>
+            </a:endParaRPr>
           </a:p>
         </p:txBody>
       </p:sp>
     </p:spTree>
     <p:extLst>
       <p:ext uri="{BB962C8B-B14F-4D97-AF65-F5344CB8AC3E}">
-        <p14:creationId xmlns:p14="http://schemas.microsoft.com/office/powerpoint/2010/main" val="1153571816"/>
+        <p14:creationId xmlns:p14="http://schemas.microsoft.com/office/powerpoint/2010/main" val="3219965551"/>
       </p:ext>
     </p:extLst>
   </p:cSld>
   <p:clrMapOvr>
     <a:masterClrMapping/>
   </p:clrMapOvr>
-</p:sld>
-</file>
-
-<file path=ppt/slides/slide17.xml><?xml version="1.0" encoding="utf-8"?>
-<p:sld xmlns:a="http://schemas.openxmlformats.org/drawingml/2006/main" xmlns:r="http://schemas.openxmlformats.org/officeDocument/2006/relationships" xmlns:p="http://schemas.openxmlformats.org/presentationml/2006/main">
-  <p:cSld>
-    <p:spTree>
-      <p:nvGrpSpPr>
-        <p:cNvPr id="1" name=""/>
-        <p:cNvGrpSpPr/>
-        <p:nvPr/>
-      </p:nvGrpSpPr>
-      <p:grpSpPr>
-        <a:xfrm>
-          <a:off x="0" y="0"/>
-          <a:ext cx="0" cy="0"/>
-          <a:chOff x="0" y="0"/>
-          <a:chExt cx="0" cy="0"/>
-        </a:xfrm>
-      </p:grpSpPr>
-      <p:sp>
-        <p:nvSpPr>
-          <p:cNvPr id="2" name="Title 1"/>
-          <p:cNvSpPr>
-            <a:spLocks noGrp="1"/>
-          </p:cNvSpPr>
-          <p:nvPr>
-            <p:ph type="title"/>
-          </p:nvPr>
-        </p:nvSpPr>
-        <p:spPr/>
-        <p:txBody>
-          <a:bodyPr/>
-          <a:lstStyle/>
-          <a:p>
-            <a:endParaRPr lang="en-US"/>
-          </a:p>
-        </p:txBody>
-      </p:sp>
-      <p:sp>
-        <p:nvSpPr>
-          <p:cNvPr id="3" name="Content Placeholder 2"/>
-          <p:cNvSpPr>
-            <a:spLocks noGrp="1"/>
-          </p:cNvSpPr>
-          <p:nvPr>
-            <p:ph idx="1"/>
-          </p:nvPr>
-        </p:nvSpPr>
-        <p:spPr/>
-        <p:txBody>
-          <a:bodyPr/>
-          <a:lstStyle/>
-          <a:p>
-            <a:endParaRPr lang="en-US"/>
-          </a:p>
-        </p:txBody>
-      </p:sp>
-      <p:sp>
-        <p:nvSpPr>
-          <p:cNvPr id="4" name="Slide Number Placeholder 3"/>
-          <p:cNvSpPr>
-            <a:spLocks noGrp="1"/>
-          </p:cNvSpPr>
-          <p:nvPr>
-            <p:ph type="sldNum" sz="quarter" idx="12"/>
-          </p:nvPr>
-        </p:nvSpPr>
-        <p:spPr/>
-        <p:txBody>
-          <a:bodyPr/>
-          <a:lstStyle/>
-          <a:p>
-            <a:fld id="{C04375EB-5169-4238-8270-5D5536267021}" type="slidenum">
-              <a:rPr lang="en-US" smtClean="0"/>
-              <a:pPr/>
-              <a:t>17</a:t>
-            </a:fld>
-            <a:endParaRPr lang="en-US"/>
-          </a:p>
-        </p:txBody>
-      </p:sp>
-    </p:spTree>
-    <p:extLst>
-      <p:ext uri="{BB962C8B-B14F-4D97-AF65-F5344CB8AC3E}">
-        <p14:creationId xmlns:p14="http://schemas.microsoft.com/office/powerpoint/2010/main" val="281262270"/>
-      </p:ext>
-    </p:extLst>
-  </p:cSld>
-  <p:clrMapOvr>
-    <a:masterClrMapping/>
-  </p:clrMapOvr>
+  <p:timing>
+    <p:tnLst>
+      <p:par>
+        <p:cTn id="1" dur="indefinite" restart="never" nodeType="tmRoot"/>
+      </p:par>
+    </p:tnLst>
+  </p:timing>
 </p:sld>
 </file>
 

</xml_diff>